<commit_message>
ajout des slides finales
</commit_message>
<xml_diff>
--- a/POlist_03_presentation.pptx
+++ b/POlist_03_presentation.pptx
@@ -26,8 +26,8 @@
     <p:sldId id="275" r:id="rId17"/>
     <p:sldId id="276" r:id="rId18"/>
     <p:sldId id="277" r:id="rId19"/>
-    <p:sldId id="278" r:id="rId20"/>
-    <p:sldId id="264" r:id="rId21"/>
+    <p:sldId id="264" r:id="rId20"/>
+    <p:sldId id="278" r:id="rId21"/>
     <p:sldId id="279" r:id="rId22"/>
     <p:sldId id="280" r:id="rId23"/>
     <p:sldId id="281" r:id="rId24"/>
@@ -129,6 +129,11 @@
       </a:defRPr>
     </a:lvl9pPr>
   </p:defaultTextStyle>
+  <p:extLst>
+    <p:ext uri="{EFAFB233-063F-42B5-8137-9DF3F51BA10A}">
+      <p15:sldGuideLst xmlns:p15="http://schemas.microsoft.com/office/powerpoint/2012/main"/>
+    </p:ext>
+  </p:extLst>
 </p:presentation>
 </file>
 
@@ -4156,6 +4161,20 @@
 <file path=ppt/slides/slide1.xml><?xml version="1.0" encoding="utf-8"?>
 <p:sld xmlns:a="http://schemas.openxmlformats.org/drawingml/2006/main" xmlns:r="http://schemas.openxmlformats.org/officeDocument/2006/relationships" xmlns:p="http://schemas.openxmlformats.org/presentationml/2006/main">
   <p:cSld>
+    <p:bg>
+      <p:bgPr>
+        <a:blipFill dpi="0" rotWithShape="1">
+          <a:blip r:embed="rId2">
+            <a:lum/>
+          </a:blip>
+          <a:srcRect/>
+          <a:stretch>
+            <a:fillRect t="-38000" b="-38000"/>
+          </a:stretch>
+        </a:blipFill>
+        <a:effectLst/>
+      </p:bgPr>
+    </p:bg>
     <p:spTree>
       <p:nvGrpSpPr>
         <p:cNvPr id="1" name=""/>
@@ -4186,25 +4205,50 @@
             <p:ph type="ctrTitle"/>
           </p:nvPr>
         </p:nvSpPr>
-        <p:spPr/>
-        <p:txBody>
-          <a:bodyPr/>
-          <a:lstStyle/>
-          <a:p>
-            <a:r>
-              <a:rPr lang="fr-FR" dirty="0">
-                <a:latin typeface="Montserrat" panose="00000500000000000000" pitchFamily="2" charset="0"/>
+        <p:spPr>
+          <a:xfrm>
+            <a:off x="5817870" y="33090"/>
+            <a:ext cx="6374130" cy="1595685"/>
+          </a:xfrm>
+        </p:spPr>
+        <p:txBody>
+          <a:bodyPr>
+            <a:noAutofit/>
+          </a:bodyPr>
+          <a:lstStyle/>
+          <a:p>
+            <a:r>
+              <a:rPr lang="fr-FR" sz="6000" dirty="0">
+                <a:solidFill>
+                  <a:schemeClr val="bg1">
+                    <a:lumMod val="95000"/>
+                  </a:schemeClr>
+                </a:solidFill>
+                <a:latin typeface="Roboto" panose="02000000000000000000" pitchFamily="2" charset="0"/>
+                <a:ea typeface="Roboto" panose="02000000000000000000" pitchFamily="2" charset="0"/>
               </a:rPr>
               <a:t>Segmentation de la clientèle d’</a:t>
             </a:r>
             <a:r>
-              <a:rPr lang="fr-FR" dirty="0" err="1">
-                <a:latin typeface="Montserrat" panose="00000500000000000000" pitchFamily="2" charset="0"/>
+              <a:rPr lang="fr-FR" sz="6000" dirty="0" err="1">
+                <a:solidFill>
+                  <a:schemeClr val="bg1">
+                    <a:lumMod val="95000"/>
+                  </a:schemeClr>
+                </a:solidFill>
+                <a:latin typeface="Roboto" panose="02000000000000000000" pitchFamily="2" charset="0"/>
+                <a:ea typeface="Roboto" panose="02000000000000000000" pitchFamily="2" charset="0"/>
               </a:rPr>
               <a:t>Olist</a:t>
             </a:r>
-            <a:endParaRPr lang="fr-FR" dirty="0">
-              <a:latin typeface="Montserrat" panose="00000500000000000000" pitchFamily="2" charset="0"/>
+            <a:endParaRPr lang="fr-FR" sz="6000" dirty="0">
+              <a:solidFill>
+                <a:schemeClr val="bg1">
+                  <a:lumMod val="95000"/>
+                </a:schemeClr>
+              </a:solidFill>
+              <a:latin typeface="Roboto" panose="02000000000000000000" pitchFamily="2" charset="0"/>
+              <a:ea typeface="Roboto" panose="02000000000000000000" pitchFamily="2" charset="0"/>
             </a:endParaRPr>
           </a:p>
         </p:txBody>
@@ -4225,12 +4269,30 @@
             <p:ph type="subTitle" idx="1"/>
           </p:nvPr>
         </p:nvSpPr>
-        <p:spPr/>
-        <p:txBody>
-          <a:bodyPr/>
-          <a:lstStyle/>
-          <a:p>
-            <a:endParaRPr lang="fr-FR"/>
+        <p:spPr>
+          <a:xfrm>
+            <a:off x="66675" y="6103145"/>
+            <a:ext cx="12192000" cy="459580"/>
+          </a:xfrm>
+        </p:spPr>
+        <p:txBody>
+          <a:bodyPr>
+            <a:normAutofit/>
+          </a:bodyPr>
+          <a:lstStyle/>
+          <a:p>
+            <a:r>
+              <a:rPr lang="fr-FR" sz="1200" i="1" cap="none" dirty="0">
+                <a:solidFill>
+                  <a:schemeClr val="bg1">
+                    <a:lumMod val="95000"/>
+                  </a:schemeClr>
+                </a:solidFill>
+                <a:latin typeface="Roboto" panose="02000000000000000000" pitchFamily="2" charset="0"/>
+                <a:ea typeface="Roboto" panose="02000000000000000000" pitchFamily="2" charset="0"/>
+              </a:rPr>
+              <a:t>Cécile Guillot, Ingénieure Machine Learning</a:t>
+            </a:r>
           </a:p>
         </p:txBody>
       </p:sp>
@@ -6621,7 +6683,7 @@
           <p:cNvPr id="2" name="Titre 1">
             <a:extLst>
               <a:ext uri="{FF2B5EF4-FFF2-40B4-BE49-F238E27FC236}">
-                <a16:creationId xmlns:a16="http://schemas.microsoft.com/office/drawing/2014/main" id="{BBFA2942-9A01-40BD-BE1B-CA26CF5B37A8}"/>
+                <a16:creationId xmlns:a16="http://schemas.microsoft.com/office/drawing/2014/main" id="{6A9CEE54-983B-4EFF-AEF3-8CFB9B0CBC3B}"/>
               </a:ext>
             </a:extLst>
           </p:cNvPr>
@@ -6629,7 +6691,7 @@
             <a:spLocks noGrp="1"/>
           </p:cNvSpPr>
           <p:nvPr>
-            <p:ph type="title"/>
+            <p:ph type="ctrTitle"/>
           </p:nvPr>
         </p:nvSpPr>
         <p:spPr/>
@@ -6637,23 +6699,22 @@
           <a:bodyPr/>
           <a:lstStyle/>
           <a:p>
-            <a:pPr algn="ctr"/>
             <a:r>
               <a:rPr lang="fr-FR" dirty="0">
                 <a:latin typeface="Roboto" panose="02000000000000000000" pitchFamily="2" charset="0"/>
                 <a:ea typeface="Roboto" panose="02000000000000000000" pitchFamily="2" charset="0"/>
               </a:rPr>
-              <a:t>Personae du K-Prototypes</a:t>
-            </a:r>
-          </a:p>
-        </p:txBody>
-      </p:sp>
-      <p:sp>
-        <p:nvSpPr>
-          <p:cNvPr id="3" name="Espace réservé du contenu 2">
+              <a:t>Conclusion</a:t>
+            </a:r>
+          </a:p>
+        </p:txBody>
+      </p:sp>
+      <p:sp>
+        <p:nvSpPr>
+          <p:cNvPr id="3" name="Sous-titre 2">
             <a:extLst>
               <a:ext uri="{FF2B5EF4-FFF2-40B4-BE49-F238E27FC236}">
-                <a16:creationId xmlns:a16="http://schemas.microsoft.com/office/drawing/2014/main" id="{E0686745-43E0-4D87-AA4A-CB67811819A8}"/>
+                <a16:creationId xmlns:a16="http://schemas.microsoft.com/office/drawing/2014/main" id="{CAFB04C3-0692-41D1-9017-8A37F9A50C0B}"/>
               </a:ext>
             </a:extLst>
           </p:cNvPr>
@@ -6661,7 +6722,7 @@
             <a:spLocks noGrp="1"/>
           </p:cNvSpPr>
           <p:nvPr>
-            <p:ph idx="1"/>
+            <p:ph type="subTitle" idx="1"/>
           </p:nvPr>
         </p:nvSpPr>
         <p:spPr/>
@@ -6669,7 +6730,13 @@
           <a:bodyPr/>
           <a:lstStyle/>
           <a:p>
-            <a:endParaRPr lang="fr-FR"/>
+            <a:r>
+              <a:rPr lang="fr-FR" dirty="0">
+                <a:latin typeface="Roboto" panose="02000000000000000000" pitchFamily="2" charset="0"/>
+                <a:ea typeface="Roboto" panose="02000000000000000000" pitchFamily="2" charset="0"/>
+              </a:rPr>
+              <a:t>Quel segmentation choisir et perspectives</a:t>
+            </a:r>
           </a:p>
         </p:txBody>
       </p:sp>
@@ -6678,7 +6745,7 @@
           <p:cNvPr id="4" name="Espace réservé du numéro de diapositive 3">
             <a:extLst>
               <a:ext uri="{FF2B5EF4-FFF2-40B4-BE49-F238E27FC236}">
-                <a16:creationId xmlns:a16="http://schemas.microsoft.com/office/drawing/2014/main" id="{35A35ABC-7F47-4955-A19A-13C1B046B9C8}"/>
+                <a16:creationId xmlns:a16="http://schemas.microsoft.com/office/drawing/2014/main" id="{0F8DE5CD-B280-406D-8ACD-23F15D7D42B8}"/>
               </a:ext>
             </a:extLst>
           </p:cNvPr>
@@ -6705,7 +6772,7 @@
     </p:spTree>
     <p:extLst>
       <p:ext uri="{BB962C8B-B14F-4D97-AF65-F5344CB8AC3E}">
-        <p14:creationId xmlns:p14="http://schemas.microsoft.com/office/powerpoint/2010/main" val="778907345"/>
+        <p14:creationId xmlns:p14="http://schemas.microsoft.com/office/powerpoint/2010/main" val="184588159"/>
       </p:ext>
     </p:extLst>
   </p:cSld>
@@ -6782,7 +6849,9 @@
         </p:nvSpPr>
         <p:spPr/>
         <p:txBody>
-          <a:bodyPr/>
+          <a:bodyPr>
+            <a:normAutofit/>
+          </a:bodyPr>
           <a:lstStyle/>
           <a:p>
             <a:pPr marL="457200" indent="-457200" algn="just">
@@ -6790,7 +6859,7 @@
               <a:buAutoNum type="arabicPeriod"/>
             </a:pPr>
             <a:r>
-              <a:rPr lang="fr-FR" dirty="0">
+              <a:rPr lang="fr-FR" sz="2800" dirty="0">
                 <a:latin typeface="Montserrat" panose="00000500000000000000" pitchFamily="2" charset="0"/>
               </a:rPr>
               <a:t>Définition de la problématique</a:t>
@@ -6802,7 +6871,7 @@
               <a:buAutoNum type="arabicPeriod"/>
             </a:pPr>
             <a:r>
-              <a:rPr lang="fr-FR" dirty="0">
+              <a:rPr lang="fr-FR" sz="2800" dirty="0">
                 <a:latin typeface="Montserrat" panose="00000500000000000000" pitchFamily="2" charset="0"/>
               </a:rPr>
               <a:t>Analyses descriptives</a:t>
@@ -6814,7 +6883,7 @@
               <a:buAutoNum type="arabicPeriod"/>
             </a:pPr>
             <a:r>
-              <a:rPr lang="fr-FR" dirty="0">
+              <a:rPr lang="fr-FR" sz="2800" dirty="0">
                 <a:latin typeface="Montserrat" panose="00000500000000000000" pitchFamily="2" charset="0"/>
               </a:rPr>
               <a:t>Différents essais de segmentation</a:t>
@@ -6826,7 +6895,7 @@
               <a:buAutoNum type="arabicPeriod"/>
             </a:pPr>
             <a:r>
-              <a:rPr lang="fr-FR" dirty="0">
+              <a:rPr lang="fr-FR" sz="2800" dirty="0">
                 <a:latin typeface="Montserrat" panose="00000500000000000000" pitchFamily="2" charset="0"/>
               </a:rPr>
               <a:t>Conclusion</a:t>
@@ -6898,7 +6967,7 @@
           <p:cNvPr id="2" name="Titre 1">
             <a:extLst>
               <a:ext uri="{FF2B5EF4-FFF2-40B4-BE49-F238E27FC236}">
-                <a16:creationId xmlns:a16="http://schemas.microsoft.com/office/drawing/2014/main" id="{6A9CEE54-983B-4EFF-AEF3-8CFB9B0CBC3B}"/>
+                <a16:creationId xmlns:a16="http://schemas.microsoft.com/office/drawing/2014/main" id="{BBFA2942-9A01-40BD-BE1B-CA26CF5B37A8}"/>
               </a:ext>
             </a:extLst>
           </p:cNvPr>
@@ -6906,61 +6975,99 @@
             <a:spLocks noGrp="1"/>
           </p:cNvSpPr>
           <p:nvPr>
-            <p:ph type="ctrTitle"/>
-          </p:nvPr>
-        </p:nvSpPr>
-        <p:spPr/>
+            <p:ph type="title"/>
+          </p:nvPr>
+        </p:nvSpPr>
+        <p:spPr>
+          <a:xfrm>
+            <a:off x="1097280" y="286604"/>
+            <a:ext cx="10058400" cy="1302500"/>
+          </a:xfrm>
+        </p:spPr>
         <p:txBody>
           <a:bodyPr/>
           <a:lstStyle/>
           <a:p>
+            <a:pPr algn="ctr"/>
+            <a:r>
+              <a:rPr lang="fr-FR" i="1" dirty="0">
+                <a:latin typeface="Roboto" panose="02000000000000000000" pitchFamily="2" charset="0"/>
+                <a:ea typeface="Roboto" panose="02000000000000000000" pitchFamily="2" charset="0"/>
+              </a:rPr>
+              <a:t>Personae</a:t>
+            </a:r>
             <a:r>
               <a:rPr lang="fr-FR" dirty="0">
                 <a:latin typeface="Roboto" panose="02000000000000000000" pitchFamily="2" charset="0"/>
                 <a:ea typeface="Roboto" panose="02000000000000000000" pitchFamily="2" charset="0"/>
               </a:rPr>
-              <a:t>Conclusion</a:t>
-            </a:r>
-          </a:p>
-        </p:txBody>
-      </p:sp>
-      <p:sp>
-        <p:nvSpPr>
-          <p:cNvPr id="3" name="Sous-titre 2">
+              <a:t> du K-Prototype</a:t>
+            </a:r>
+          </a:p>
+        </p:txBody>
+      </p:sp>
+      <p:pic>
+        <p:nvPicPr>
+          <p:cNvPr id="6" name="Espace réservé du contenu 5">
             <a:extLst>
               <a:ext uri="{FF2B5EF4-FFF2-40B4-BE49-F238E27FC236}">
-                <a16:creationId xmlns:a16="http://schemas.microsoft.com/office/drawing/2014/main" id="{CAFB04C3-0692-41D1-9017-8A37F9A50C0B}"/>
+                <a16:creationId xmlns:a16="http://schemas.microsoft.com/office/drawing/2014/main" id="{6C742CAB-50EC-46DF-8209-EA7314DB383D}"/>
               </a:ext>
             </a:extLst>
           </p:cNvPr>
-          <p:cNvSpPr>
-            <a:spLocks noGrp="1"/>
-          </p:cNvSpPr>
-          <p:nvPr>
-            <p:ph type="subTitle" idx="1"/>
-          </p:nvPr>
-        </p:nvSpPr>
-        <p:spPr/>
-        <p:txBody>
-          <a:bodyPr/>
-          <a:lstStyle/>
-          <a:p>
-            <a:r>
-              <a:rPr lang="fr-FR" dirty="0">
-                <a:latin typeface="Roboto" panose="02000000000000000000" pitchFamily="2" charset="0"/>
-                <a:ea typeface="Roboto" panose="02000000000000000000" pitchFamily="2" charset="0"/>
-              </a:rPr>
-              <a:t>Quel segmentation choisir et perspectives</a:t>
-            </a:r>
-          </a:p>
-        </p:txBody>
-      </p:sp>
+          <p:cNvPicPr>
+            <a:picLocks noGrp="1" noChangeAspect="1"/>
+          </p:cNvPicPr>
+          <p:nvPr>
+            <p:ph idx="1"/>
+          </p:nvPr>
+        </p:nvPicPr>
+        <p:blipFill>
+          <a:blip r:embed="rId2"/>
+          <a:stretch>
+            <a:fillRect/>
+          </a:stretch>
+        </p:blipFill>
+        <p:spPr>
+          <a:xfrm>
+            <a:off x="340906" y="2011653"/>
+            <a:ext cx="1985059" cy="1846318"/>
+          </a:xfrm>
+          <a:prstGeom prst="ellipse">
+            <a:avLst/>
+          </a:prstGeom>
+          <a:ln w="63500" cap="rnd">
+            <a:solidFill>
+              <a:srgbClr val="333333"/>
+            </a:solidFill>
+          </a:ln>
+          <a:effectLst>
+            <a:outerShdw blurRad="381000" dist="292100" dir="5400000" sx="-80000" sy="-18000" rotWithShape="0">
+              <a:srgbClr val="000000">
+                <a:alpha val="22000"/>
+              </a:srgbClr>
+            </a:outerShdw>
+          </a:effectLst>
+          <a:scene3d>
+            <a:camera prst="orthographicFront"/>
+            <a:lightRig rig="contrasting" dir="t">
+              <a:rot lat="0" lon="0" rev="3000000"/>
+            </a:lightRig>
+          </a:scene3d>
+          <a:sp3d contourW="7620">
+            <a:bevelT w="95250" h="31750"/>
+            <a:contourClr>
+              <a:srgbClr val="333333"/>
+            </a:contourClr>
+          </a:sp3d>
+        </p:spPr>
+      </p:pic>
       <p:sp>
         <p:nvSpPr>
           <p:cNvPr id="4" name="Espace réservé du numéro de diapositive 3">
             <a:extLst>
               <a:ext uri="{FF2B5EF4-FFF2-40B4-BE49-F238E27FC236}">
-                <a16:creationId xmlns:a16="http://schemas.microsoft.com/office/drawing/2014/main" id="{0F8DE5CD-B280-406D-8ACD-23F15D7D42B8}"/>
+                <a16:creationId xmlns:a16="http://schemas.microsoft.com/office/drawing/2014/main" id="{35A35ABC-7F47-4955-A19A-13C1B046B9C8}"/>
               </a:ext>
             </a:extLst>
           </p:cNvPr>
@@ -6984,10 +7091,722 @@
           </a:p>
         </p:txBody>
       </p:sp>
+      <p:pic>
+        <p:nvPicPr>
+          <p:cNvPr id="8" name="Image 7">
+            <a:extLst>
+              <a:ext uri="{FF2B5EF4-FFF2-40B4-BE49-F238E27FC236}">
+                <a16:creationId xmlns:a16="http://schemas.microsoft.com/office/drawing/2014/main" id="{504A2A2C-F21A-4852-ABF5-87B6C476E13B}"/>
+              </a:ext>
+            </a:extLst>
+          </p:cNvPr>
+          <p:cNvPicPr>
+            <a:picLocks noChangeAspect="1"/>
+          </p:cNvPicPr>
+          <p:nvPr/>
+        </p:nvPicPr>
+        <p:blipFill>
+          <a:blip r:embed="rId3"/>
+          <a:stretch>
+            <a:fillRect/>
+          </a:stretch>
+        </p:blipFill>
+        <p:spPr>
+          <a:xfrm>
+            <a:off x="2684893" y="2011171"/>
+            <a:ext cx="2039175" cy="1846800"/>
+          </a:xfrm>
+          <a:prstGeom prst="ellipse">
+            <a:avLst/>
+          </a:prstGeom>
+          <a:ln w="63500" cap="rnd">
+            <a:solidFill>
+              <a:srgbClr val="333333"/>
+            </a:solidFill>
+          </a:ln>
+          <a:effectLst>
+            <a:outerShdw blurRad="381000" dist="292100" dir="5400000" sx="-80000" sy="-18000" rotWithShape="0">
+              <a:srgbClr val="000000">
+                <a:alpha val="22000"/>
+              </a:srgbClr>
+            </a:outerShdw>
+          </a:effectLst>
+          <a:scene3d>
+            <a:camera prst="orthographicFront"/>
+            <a:lightRig rig="contrasting" dir="t">
+              <a:rot lat="0" lon="0" rev="3000000"/>
+            </a:lightRig>
+          </a:scene3d>
+          <a:sp3d contourW="7620">
+            <a:bevelT w="95250" h="31750"/>
+            <a:contourClr>
+              <a:srgbClr val="333333"/>
+            </a:contourClr>
+          </a:sp3d>
+        </p:spPr>
+      </p:pic>
+      <p:pic>
+        <p:nvPicPr>
+          <p:cNvPr id="10" name="Image 9">
+            <a:extLst>
+              <a:ext uri="{FF2B5EF4-FFF2-40B4-BE49-F238E27FC236}">
+                <a16:creationId xmlns:a16="http://schemas.microsoft.com/office/drawing/2014/main" id="{4B48F4B7-D99B-4E6E-B6BF-68A7179D2D33}"/>
+              </a:ext>
+            </a:extLst>
+          </p:cNvPr>
+          <p:cNvPicPr>
+            <a:picLocks noChangeAspect="1"/>
+          </p:cNvPicPr>
+          <p:nvPr/>
+        </p:nvPicPr>
+        <p:blipFill>
+          <a:blip r:embed="rId4"/>
+          <a:stretch>
+            <a:fillRect/>
+          </a:stretch>
+        </p:blipFill>
+        <p:spPr>
+          <a:xfrm>
+            <a:off x="5082996" y="2011171"/>
+            <a:ext cx="1878369" cy="1846800"/>
+          </a:xfrm>
+          <a:prstGeom prst="ellipse">
+            <a:avLst/>
+          </a:prstGeom>
+          <a:ln w="63500" cap="rnd">
+            <a:solidFill>
+              <a:srgbClr val="333333"/>
+            </a:solidFill>
+          </a:ln>
+          <a:effectLst>
+            <a:outerShdw blurRad="381000" dist="292100" dir="5400000" sx="-80000" sy="-18000" rotWithShape="0">
+              <a:srgbClr val="000000">
+                <a:alpha val="22000"/>
+              </a:srgbClr>
+            </a:outerShdw>
+          </a:effectLst>
+          <a:scene3d>
+            <a:camera prst="orthographicFront"/>
+            <a:lightRig rig="contrasting" dir="t">
+              <a:rot lat="0" lon="0" rev="3000000"/>
+            </a:lightRig>
+          </a:scene3d>
+          <a:sp3d contourW="7620">
+            <a:bevelT w="95250" h="31750"/>
+            <a:contourClr>
+              <a:srgbClr val="333333"/>
+            </a:contourClr>
+          </a:sp3d>
+        </p:spPr>
+      </p:pic>
+      <p:pic>
+        <p:nvPicPr>
+          <p:cNvPr id="12" name="Image 11">
+            <a:extLst>
+              <a:ext uri="{FF2B5EF4-FFF2-40B4-BE49-F238E27FC236}">
+                <a16:creationId xmlns:a16="http://schemas.microsoft.com/office/drawing/2014/main" id="{9E3A970A-BFC2-468B-BA5F-20183733813A}"/>
+              </a:ext>
+            </a:extLst>
+          </p:cNvPr>
+          <p:cNvPicPr>
+            <a:picLocks noChangeAspect="1"/>
+          </p:cNvPicPr>
+          <p:nvPr/>
+        </p:nvPicPr>
+        <p:blipFill>
+          <a:blip r:embed="rId5"/>
+          <a:stretch>
+            <a:fillRect/>
+          </a:stretch>
+        </p:blipFill>
+        <p:spPr>
+          <a:xfrm>
+            <a:off x="7320293" y="2011171"/>
+            <a:ext cx="1863339" cy="1846800"/>
+          </a:xfrm>
+          <a:prstGeom prst="ellipse">
+            <a:avLst/>
+          </a:prstGeom>
+          <a:ln w="63500" cap="rnd">
+            <a:solidFill>
+              <a:srgbClr val="333333"/>
+            </a:solidFill>
+          </a:ln>
+          <a:effectLst>
+            <a:outerShdw blurRad="381000" dist="292100" dir="5400000" sx="-80000" sy="-18000" rotWithShape="0">
+              <a:srgbClr val="000000">
+                <a:alpha val="22000"/>
+              </a:srgbClr>
+            </a:outerShdw>
+          </a:effectLst>
+          <a:scene3d>
+            <a:camera prst="orthographicFront"/>
+            <a:lightRig rig="contrasting" dir="t">
+              <a:rot lat="0" lon="0" rev="3000000"/>
+            </a:lightRig>
+          </a:scene3d>
+          <a:sp3d contourW="7620">
+            <a:bevelT w="95250" h="31750"/>
+            <a:contourClr>
+              <a:srgbClr val="333333"/>
+            </a:contourClr>
+          </a:sp3d>
+        </p:spPr>
+      </p:pic>
+      <p:pic>
+        <p:nvPicPr>
+          <p:cNvPr id="14" name="Image 13">
+            <a:extLst>
+              <a:ext uri="{FF2B5EF4-FFF2-40B4-BE49-F238E27FC236}">
+                <a16:creationId xmlns:a16="http://schemas.microsoft.com/office/drawing/2014/main" id="{E705C758-141A-4CDC-B773-2FB5CDC315DC}"/>
+              </a:ext>
+            </a:extLst>
+          </p:cNvPr>
+          <p:cNvPicPr>
+            <a:picLocks noChangeAspect="1"/>
+          </p:cNvPicPr>
+          <p:nvPr/>
+        </p:nvPicPr>
+        <p:blipFill>
+          <a:blip r:embed="rId6"/>
+          <a:stretch>
+            <a:fillRect/>
+          </a:stretch>
+        </p:blipFill>
+        <p:spPr>
+          <a:xfrm>
+            <a:off x="9548478" y="2011171"/>
+            <a:ext cx="1732091" cy="1846800"/>
+          </a:xfrm>
+          <a:prstGeom prst="ellipse">
+            <a:avLst/>
+          </a:prstGeom>
+          <a:ln w="63500" cap="rnd">
+            <a:solidFill>
+              <a:srgbClr val="333333"/>
+            </a:solidFill>
+          </a:ln>
+          <a:effectLst>
+            <a:outerShdw blurRad="381000" dist="292100" dir="5400000" sx="-80000" sy="-18000" rotWithShape="0">
+              <a:srgbClr val="000000">
+                <a:alpha val="22000"/>
+              </a:srgbClr>
+            </a:outerShdw>
+          </a:effectLst>
+          <a:scene3d>
+            <a:camera prst="orthographicFront"/>
+            <a:lightRig rig="contrasting" dir="t">
+              <a:rot lat="0" lon="0" rev="3000000"/>
+            </a:lightRig>
+          </a:scene3d>
+          <a:sp3d contourW="7620">
+            <a:bevelT w="95250" h="31750"/>
+            <a:contourClr>
+              <a:srgbClr val="333333"/>
+            </a:contourClr>
+          </a:sp3d>
+        </p:spPr>
+      </p:pic>
+      <p:sp>
+        <p:nvSpPr>
+          <p:cNvPr id="15" name="ZoneTexte 14">
+            <a:extLst>
+              <a:ext uri="{FF2B5EF4-FFF2-40B4-BE49-F238E27FC236}">
+                <a16:creationId xmlns:a16="http://schemas.microsoft.com/office/drawing/2014/main" id="{540B4D12-3183-498F-8B9B-88B00BD0864B}"/>
+              </a:ext>
+            </a:extLst>
+          </p:cNvPr>
+          <p:cNvSpPr txBox="1"/>
+          <p:nvPr/>
+        </p:nvSpPr>
+        <p:spPr>
+          <a:xfrm>
+            <a:off x="195308" y="4625266"/>
+            <a:ext cx="2237173" cy="954107"/>
+          </a:xfrm>
+          <a:prstGeom prst="rect">
+            <a:avLst/>
+          </a:prstGeom>
+          <a:noFill/>
+        </p:spPr>
+        <p:txBody>
+          <a:bodyPr wrap="square" rtlCol="0">
+            <a:spAutoFit/>
+          </a:bodyPr>
+          <a:lstStyle/>
+          <a:p>
+            <a:pPr algn="ctr"/>
+            <a:r>
+              <a:rPr lang="fr-FR" sz="1400" b="1" u="sng" dirty="0">
+                <a:latin typeface="Montserrat" panose="00000500000000000000" pitchFamily="2" charset="0"/>
+              </a:rPr>
+              <a:t>Le client moyen</a:t>
+            </a:r>
+          </a:p>
+          <a:p>
+            <a:pPr marL="285750" indent="-285750">
+              <a:buClr>
+                <a:schemeClr val="accent1">
+                  <a:lumMod val="60000"/>
+                  <a:lumOff val="40000"/>
+                </a:schemeClr>
+              </a:buClr>
+              <a:buFont typeface="Arial" panose="020B0604020202020204" pitchFamily="34" charset="0"/>
+              <a:buChar char="•"/>
+            </a:pPr>
+            <a:r>
+              <a:rPr lang="fr-FR" sz="1400" dirty="0">
+                <a:latin typeface="Montserrat" panose="00000500000000000000" pitchFamily="2" charset="0"/>
+              </a:rPr>
+              <a:t>Commande unique</a:t>
+            </a:r>
+          </a:p>
+          <a:p>
+            <a:pPr marL="285750" indent="-285750">
+              <a:buClr>
+                <a:schemeClr val="accent1">
+                  <a:lumMod val="60000"/>
+                  <a:lumOff val="40000"/>
+                </a:schemeClr>
+              </a:buClr>
+              <a:buFont typeface="Arial" panose="020B0604020202020204" pitchFamily="34" charset="0"/>
+              <a:buChar char="•"/>
+            </a:pPr>
+            <a:r>
+              <a:rPr lang="fr-FR" sz="1400" dirty="0">
+                <a:latin typeface="Montserrat" panose="00000500000000000000" pitchFamily="2" charset="0"/>
+              </a:rPr>
+              <a:t>Valeur de 116 Réaux</a:t>
+            </a:r>
+          </a:p>
+          <a:p>
+            <a:pPr marL="285750" indent="-285750">
+              <a:buClr>
+                <a:schemeClr val="accent1">
+                  <a:lumMod val="60000"/>
+                  <a:lumOff val="40000"/>
+                </a:schemeClr>
+              </a:buClr>
+              <a:buFont typeface="Arial" panose="020B0604020202020204" pitchFamily="34" charset="0"/>
+              <a:buChar char="•"/>
+            </a:pPr>
+            <a:r>
+              <a:rPr lang="fr-FR" sz="1400" dirty="0">
+                <a:latin typeface="Montserrat" panose="00000500000000000000" pitchFamily="2" charset="0"/>
+              </a:rPr>
+              <a:t>4.22/5</a:t>
+            </a:r>
+          </a:p>
+        </p:txBody>
+      </p:sp>
+      <p:sp>
+        <p:nvSpPr>
+          <p:cNvPr id="16" name="ZoneTexte 15">
+            <a:extLst>
+              <a:ext uri="{FF2B5EF4-FFF2-40B4-BE49-F238E27FC236}">
+                <a16:creationId xmlns:a16="http://schemas.microsoft.com/office/drawing/2014/main" id="{06676FE0-10D4-45AA-A811-D1BD5C0E4018}"/>
+              </a:ext>
+            </a:extLst>
+          </p:cNvPr>
+          <p:cNvSpPr txBox="1"/>
+          <p:nvPr/>
+        </p:nvSpPr>
+        <p:spPr>
+          <a:xfrm>
+            <a:off x="2585893" y="4626746"/>
+            <a:ext cx="2237173" cy="1384995"/>
+          </a:xfrm>
+          <a:prstGeom prst="rect">
+            <a:avLst/>
+          </a:prstGeom>
+          <a:noFill/>
+        </p:spPr>
+        <p:txBody>
+          <a:bodyPr wrap="square" rtlCol="0">
+            <a:spAutoFit/>
+          </a:bodyPr>
+          <a:lstStyle/>
+          <a:p>
+            <a:pPr algn="ctr"/>
+            <a:r>
+              <a:rPr lang="fr-FR" sz="1400" b="1" u="sng" dirty="0">
+                <a:latin typeface="Montserrat" panose="00000500000000000000" pitchFamily="2" charset="0"/>
+              </a:rPr>
+              <a:t>Le satisfait</a:t>
+            </a:r>
+          </a:p>
+          <a:p>
+            <a:pPr marL="285750" indent="-285750">
+              <a:buClr>
+                <a:schemeClr val="accent1">
+                  <a:lumMod val="60000"/>
+                  <a:lumOff val="40000"/>
+                </a:schemeClr>
+              </a:buClr>
+              <a:buFont typeface="Arial" panose="020B0604020202020204" pitchFamily="34" charset="0"/>
+              <a:buChar char="•"/>
+            </a:pPr>
+            <a:r>
+              <a:rPr lang="fr-FR" sz="1400" dirty="0">
+                <a:latin typeface="Montserrat" panose="00000500000000000000" pitchFamily="2" charset="0"/>
+              </a:rPr>
+              <a:t>Commande unique</a:t>
+            </a:r>
+          </a:p>
+          <a:p>
+            <a:pPr marL="285750" indent="-285750">
+              <a:buClr>
+                <a:schemeClr val="accent1">
+                  <a:lumMod val="60000"/>
+                  <a:lumOff val="40000"/>
+                </a:schemeClr>
+              </a:buClr>
+              <a:buFont typeface="Arial" panose="020B0604020202020204" pitchFamily="34" charset="0"/>
+              <a:buChar char="•"/>
+            </a:pPr>
+            <a:r>
+              <a:rPr lang="fr-FR" sz="1400" dirty="0">
+                <a:latin typeface="Montserrat" panose="00000500000000000000" pitchFamily="2" charset="0"/>
+              </a:rPr>
+              <a:t>Valeur de 112 Réaux</a:t>
+            </a:r>
+          </a:p>
+          <a:p>
+            <a:pPr marL="285750" indent="-285750">
+              <a:buClr>
+                <a:schemeClr val="accent1">
+                  <a:lumMod val="60000"/>
+                  <a:lumOff val="40000"/>
+                </a:schemeClr>
+              </a:buClr>
+              <a:buFont typeface="Arial" panose="020B0604020202020204" pitchFamily="34" charset="0"/>
+              <a:buChar char="•"/>
+            </a:pPr>
+            <a:r>
+              <a:rPr lang="fr-FR" sz="1400" dirty="0">
+                <a:latin typeface="Montserrat" panose="00000500000000000000" pitchFamily="2" charset="0"/>
+              </a:rPr>
+              <a:t>Faible délai de livraison</a:t>
+            </a:r>
+          </a:p>
+          <a:p>
+            <a:pPr marL="285750" indent="-285750">
+              <a:buClr>
+                <a:schemeClr val="accent1">
+                  <a:lumMod val="60000"/>
+                  <a:lumOff val="40000"/>
+                </a:schemeClr>
+              </a:buClr>
+              <a:buFont typeface="Arial" panose="020B0604020202020204" pitchFamily="34" charset="0"/>
+              <a:buChar char="•"/>
+            </a:pPr>
+            <a:r>
+              <a:rPr lang="fr-FR" sz="1400" dirty="0">
+                <a:latin typeface="Montserrat" panose="00000500000000000000" pitchFamily="2" charset="0"/>
+              </a:rPr>
+              <a:t>4.34/5</a:t>
+            </a:r>
+          </a:p>
+        </p:txBody>
+      </p:sp>
+      <p:sp>
+        <p:nvSpPr>
+          <p:cNvPr id="17" name="ZoneTexte 16">
+            <a:extLst>
+              <a:ext uri="{FF2B5EF4-FFF2-40B4-BE49-F238E27FC236}">
+                <a16:creationId xmlns:a16="http://schemas.microsoft.com/office/drawing/2014/main" id="{BC4F4AC0-84A6-412A-9EA9-A7D2188AE2B8}"/>
+              </a:ext>
+            </a:extLst>
+          </p:cNvPr>
+          <p:cNvSpPr txBox="1"/>
+          <p:nvPr/>
+        </p:nvSpPr>
+        <p:spPr>
+          <a:xfrm>
+            <a:off x="4903593" y="4625266"/>
+            <a:ext cx="2237173" cy="1384995"/>
+          </a:xfrm>
+          <a:prstGeom prst="rect">
+            <a:avLst/>
+          </a:prstGeom>
+          <a:noFill/>
+        </p:spPr>
+        <p:txBody>
+          <a:bodyPr wrap="square" rtlCol="0">
+            <a:spAutoFit/>
+          </a:bodyPr>
+          <a:lstStyle/>
+          <a:p>
+            <a:pPr algn="ctr"/>
+            <a:r>
+              <a:rPr lang="fr-FR" sz="1400" b="1" u="sng" dirty="0">
+                <a:latin typeface="Montserrat" panose="00000500000000000000" pitchFamily="2" charset="0"/>
+              </a:rPr>
+              <a:t>L’exigent</a:t>
+            </a:r>
+          </a:p>
+          <a:p>
+            <a:pPr marL="285750" indent="-285750">
+              <a:buClr>
+                <a:schemeClr val="accent1">
+                  <a:lumMod val="60000"/>
+                  <a:lumOff val="40000"/>
+                </a:schemeClr>
+              </a:buClr>
+              <a:buFont typeface="Arial" panose="020B0604020202020204" pitchFamily="34" charset="0"/>
+              <a:buChar char="•"/>
+            </a:pPr>
+            <a:r>
+              <a:rPr lang="fr-FR" sz="1400" dirty="0">
+                <a:latin typeface="Montserrat" panose="00000500000000000000" pitchFamily="2" charset="0"/>
+              </a:rPr>
+              <a:t>Commande unique</a:t>
+            </a:r>
+          </a:p>
+          <a:p>
+            <a:pPr marL="285750" indent="-285750">
+              <a:buClr>
+                <a:schemeClr val="accent1">
+                  <a:lumMod val="60000"/>
+                  <a:lumOff val="40000"/>
+                </a:schemeClr>
+              </a:buClr>
+              <a:buFont typeface="Arial" panose="020B0604020202020204" pitchFamily="34" charset="0"/>
+              <a:buChar char="•"/>
+            </a:pPr>
+            <a:r>
+              <a:rPr lang="fr-FR" sz="1400" dirty="0">
+                <a:latin typeface="Montserrat" panose="00000500000000000000" pitchFamily="2" charset="0"/>
+              </a:rPr>
+              <a:t>Valeur de 350 Réaux</a:t>
+            </a:r>
+          </a:p>
+          <a:p>
+            <a:pPr marL="285750" indent="-285750">
+              <a:buClr>
+                <a:schemeClr val="accent1">
+                  <a:lumMod val="60000"/>
+                  <a:lumOff val="40000"/>
+                </a:schemeClr>
+              </a:buClr>
+              <a:buFont typeface="Arial" panose="020B0604020202020204" pitchFamily="34" charset="0"/>
+              <a:buChar char="•"/>
+            </a:pPr>
+            <a:r>
+              <a:rPr lang="fr-FR" sz="1400" dirty="0">
+                <a:latin typeface="Montserrat" panose="00000500000000000000" pitchFamily="2" charset="0"/>
+              </a:rPr>
+              <a:t>Catégorie de valeur</a:t>
+            </a:r>
+          </a:p>
+          <a:p>
+            <a:pPr marL="285750" indent="-285750">
+              <a:buClr>
+                <a:schemeClr val="accent1">
+                  <a:lumMod val="60000"/>
+                  <a:lumOff val="40000"/>
+                </a:schemeClr>
+              </a:buClr>
+              <a:buFont typeface="Arial" panose="020B0604020202020204" pitchFamily="34" charset="0"/>
+              <a:buChar char="•"/>
+            </a:pPr>
+            <a:r>
+              <a:rPr lang="fr-FR" sz="1400" dirty="0">
+                <a:latin typeface="Montserrat" panose="00000500000000000000" pitchFamily="2" charset="0"/>
+              </a:rPr>
+              <a:t>3.81/5</a:t>
+            </a:r>
+          </a:p>
+        </p:txBody>
+      </p:sp>
+      <p:sp>
+        <p:nvSpPr>
+          <p:cNvPr id="18" name="ZoneTexte 17">
+            <a:extLst>
+              <a:ext uri="{FF2B5EF4-FFF2-40B4-BE49-F238E27FC236}">
+                <a16:creationId xmlns:a16="http://schemas.microsoft.com/office/drawing/2014/main" id="{93B32D5F-4013-49D5-B51E-5C184957953A}"/>
+              </a:ext>
+            </a:extLst>
+          </p:cNvPr>
+          <p:cNvSpPr txBox="1"/>
+          <p:nvPr/>
+        </p:nvSpPr>
+        <p:spPr>
+          <a:xfrm>
+            <a:off x="7294178" y="4625264"/>
+            <a:ext cx="2458645" cy="1169551"/>
+          </a:xfrm>
+          <a:prstGeom prst="rect">
+            <a:avLst/>
+          </a:prstGeom>
+          <a:noFill/>
+        </p:spPr>
+        <p:txBody>
+          <a:bodyPr wrap="square" rtlCol="0">
+            <a:spAutoFit/>
+          </a:bodyPr>
+          <a:lstStyle/>
+          <a:p>
+            <a:pPr algn="ctr"/>
+            <a:r>
+              <a:rPr lang="fr-FR" sz="1400" b="1" u="sng" dirty="0">
+                <a:latin typeface="Montserrat" panose="00000500000000000000" pitchFamily="2" charset="0"/>
+              </a:rPr>
+              <a:t>Le fidèle</a:t>
+            </a:r>
+          </a:p>
+          <a:p>
+            <a:pPr marL="285750" indent="-285750">
+              <a:buClr>
+                <a:schemeClr val="accent1">
+                  <a:lumMod val="60000"/>
+                  <a:lumOff val="40000"/>
+                </a:schemeClr>
+              </a:buClr>
+              <a:buFont typeface="Arial" panose="020B0604020202020204" pitchFamily="34" charset="0"/>
+              <a:buChar char="•"/>
+            </a:pPr>
+            <a:r>
+              <a:rPr lang="fr-FR" sz="1400" dirty="0">
+                <a:latin typeface="Montserrat" panose="00000500000000000000" pitchFamily="2" charset="0"/>
+              </a:rPr>
+              <a:t>Plusieurs commandes</a:t>
+            </a:r>
+          </a:p>
+          <a:p>
+            <a:pPr marL="285750" indent="-285750">
+              <a:buClr>
+                <a:schemeClr val="accent1">
+                  <a:lumMod val="60000"/>
+                  <a:lumOff val="40000"/>
+                </a:schemeClr>
+              </a:buClr>
+              <a:buFont typeface="Arial" panose="020B0604020202020204" pitchFamily="34" charset="0"/>
+              <a:buChar char="•"/>
+            </a:pPr>
+            <a:r>
+              <a:rPr lang="fr-FR" sz="1400" dirty="0">
+                <a:latin typeface="Montserrat" panose="00000500000000000000" pitchFamily="2" charset="0"/>
+              </a:rPr>
+              <a:t>Valeur de 92 Réaux</a:t>
+            </a:r>
+          </a:p>
+          <a:p>
+            <a:pPr marL="285750" indent="-285750">
+              <a:buClr>
+                <a:schemeClr val="accent1">
+                  <a:lumMod val="60000"/>
+                  <a:lumOff val="40000"/>
+                </a:schemeClr>
+              </a:buClr>
+              <a:buFont typeface="Arial" panose="020B0604020202020204" pitchFamily="34" charset="0"/>
+              <a:buChar char="•"/>
+            </a:pPr>
+            <a:r>
+              <a:rPr lang="fr-FR" sz="1400" dirty="0">
+                <a:latin typeface="Montserrat" panose="00000500000000000000" pitchFamily="2" charset="0"/>
+              </a:rPr>
+              <a:t>4.03/5</a:t>
+            </a:r>
+          </a:p>
+        </p:txBody>
+      </p:sp>
+      <p:sp>
+        <p:nvSpPr>
+          <p:cNvPr id="19" name="ZoneTexte 18">
+            <a:extLst>
+              <a:ext uri="{FF2B5EF4-FFF2-40B4-BE49-F238E27FC236}">
+                <a16:creationId xmlns:a16="http://schemas.microsoft.com/office/drawing/2014/main" id="{8140AE7C-5B17-4478-811B-0BC8502E76C9}"/>
+              </a:ext>
+            </a:extLst>
+          </p:cNvPr>
+          <p:cNvSpPr txBox="1"/>
+          <p:nvPr/>
+        </p:nvSpPr>
+        <p:spPr>
+          <a:xfrm>
+            <a:off x="9452932" y="4625264"/>
+            <a:ext cx="2458645" cy="954107"/>
+          </a:xfrm>
+          <a:prstGeom prst="rect">
+            <a:avLst/>
+          </a:prstGeom>
+          <a:noFill/>
+        </p:spPr>
+        <p:txBody>
+          <a:bodyPr wrap="square" rtlCol="0">
+            <a:spAutoFit/>
+          </a:bodyPr>
+          <a:lstStyle/>
+          <a:p>
+            <a:pPr algn="ctr"/>
+            <a:r>
+              <a:rPr lang="fr-FR" sz="1400" b="1" u="sng" dirty="0">
+                <a:latin typeface="Montserrat" panose="00000500000000000000" pitchFamily="2" charset="0"/>
+              </a:rPr>
+              <a:t>Le frileux</a:t>
+            </a:r>
+          </a:p>
+          <a:p>
+            <a:pPr marL="285750" indent="-285750">
+              <a:buClr>
+                <a:schemeClr val="accent1">
+                  <a:lumMod val="60000"/>
+                  <a:lumOff val="40000"/>
+                </a:schemeClr>
+              </a:buClr>
+              <a:buFont typeface="Arial" panose="020B0604020202020204" pitchFamily="34" charset="0"/>
+              <a:buChar char="•"/>
+            </a:pPr>
+            <a:r>
+              <a:rPr lang="fr-FR" sz="1400" dirty="0">
+                <a:latin typeface="Montserrat" panose="00000500000000000000" pitchFamily="2" charset="0"/>
+              </a:rPr>
+              <a:t>Commande unique</a:t>
+            </a:r>
+          </a:p>
+          <a:p>
+            <a:pPr marL="285750" indent="-285750">
+              <a:buClr>
+                <a:schemeClr val="accent1">
+                  <a:lumMod val="60000"/>
+                  <a:lumOff val="40000"/>
+                </a:schemeClr>
+              </a:buClr>
+              <a:buFont typeface="Arial" panose="020B0604020202020204" pitchFamily="34" charset="0"/>
+              <a:buChar char="•"/>
+            </a:pPr>
+            <a:r>
+              <a:rPr lang="fr-FR" sz="1400" dirty="0">
+                <a:latin typeface="Montserrat" panose="00000500000000000000" pitchFamily="2" charset="0"/>
+              </a:rPr>
+              <a:t>Valeur de 88 Réaux</a:t>
+            </a:r>
+          </a:p>
+          <a:p>
+            <a:pPr marL="285750" indent="-285750">
+              <a:buClr>
+                <a:schemeClr val="accent1">
+                  <a:lumMod val="60000"/>
+                  <a:lumOff val="40000"/>
+                </a:schemeClr>
+              </a:buClr>
+              <a:buFont typeface="Arial" panose="020B0604020202020204" pitchFamily="34" charset="0"/>
+              <a:buChar char="•"/>
+            </a:pPr>
+            <a:r>
+              <a:rPr lang="fr-FR" sz="1400" dirty="0">
+                <a:latin typeface="Montserrat" panose="00000500000000000000" pitchFamily="2" charset="0"/>
+              </a:rPr>
+              <a:t>4.19/5</a:t>
+            </a:r>
+          </a:p>
+        </p:txBody>
+      </p:sp>
     </p:spTree>
     <p:extLst>
       <p:ext uri="{BB962C8B-B14F-4D97-AF65-F5344CB8AC3E}">
-        <p14:creationId xmlns:p14="http://schemas.microsoft.com/office/powerpoint/2010/main" val="184588159"/>
+        <p14:creationId xmlns:p14="http://schemas.microsoft.com/office/powerpoint/2010/main" val="778907345"/>
       </p:ext>
     </p:extLst>
   </p:cSld>
@@ -7037,7 +7856,10 @@
           <a:p>
             <a:pPr algn="ctr"/>
             <a:r>
-              <a:rPr lang="fr-FR" b="1" dirty="0"/>
+              <a:rPr lang="fr-FR" dirty="0">
+                <a:latin typeface="Roboto" panose="02000000000000000000" pitchFamily="2" charset="0"/>
+                <a:ea typeface="Roboto" panose="02000000000000000000" pitchFamily="2" charset="0"/>
+              </a:rPr>
               <a:t>Conclusion</a:t>
             </a:r>
           </a:p>
@@ -7064,7 +7886,137 @@
           <a:bodyPr/>
           <a:lstStyle/>
           <a:p>
-            <a:endParaRPr lang="fr-FR"/>
+            <a:pPr lvl="1">
+              <a:buFont typeface="Arial" panose="020B0604020202020204" pitchFamily="34" charset="0"/>
+              <a:buChar char="•"/>
+            </a:pPr>
+            <a:r>
+              <a:rPr lang="fr-FR" sz="2000" dirty="0">
+                <a:latin typeface="Montserrat" panose="00000500000000000000" pitchFamily="2" charset="0"/>
+              </a:rPr>
+              <a:t>K-Prototype : </a:t>
+            </a:r>
+          </a:p>
+          <a:p>
+            <a:pPr lvl="2">
+              <a:buFont typeface="Courier New" panose="02070309020205020404" pitchFamily="49" charset="0"/>
+              <a:buChar char="o"/>
+            </a:pPr>
+            <a:r>
+              <a:rPr lang="fr-FR" sz="1600" dirty="0">
+                <a:latin typeface="Montserrat" panose="00000500000000000000" pitchFamily="2" charset="0"/>
+              </a:rPr>
+              <a:t>Utilisation de différents types de variables (quantitatives et catégorielles)</a:t>
+            </a:r>
+          </a:p>
+          <a:p>
+            <a:pPr lvl="2">
+              <a:buFont typeface="Courier New" panose="02070309020205020404" pitchFamily="49" charset="0"/>
+              <a:buChar char="o"/>
+            </a:pPr>
+            <a:r>
+              <a:rPr lang="fr-FR" sz="1600" dirty="0">
+                <a:latin typeface="Montserrat" panose="00000500000000000000" pitchFamily="2" charset="0"/>
+              </a:rPr>
+              <a:t>Modèle stable sur 6 mois </a:t>
+            </a:r>
+            <a:r>
+              <a:rPr lang="fr-FR" sz="1600" dirty="0">
+                <a:latin typeface="Times New Roman" panose="02020603050405020304" pitchFamily="18" charset="0"/>
+                <a:cs typeface="Times New Roman" panose="02020603050405020304" pitchFamily="18" charset="0"/>
+              </a:rPr>
+              <a:t>→ </a:t>
+            </a:r>
+            <a:r>
+              <a:rPr lang="fr-FR" sz="1600" dirty="0">
+                <a:latin typeface="Montserrat" panose="00000500000000000000" pitchFamily="2" charset="0"/>
+              </a:rPr>
+              <a:t>Ne nécessite pas beaucoup de maintenance</a:t>
+            </a:r>
+          </a:p>
+          <a:p>
+            <a:pPr lvl="1">
+              <a:buFont typeface="Arial" panose="020B0604020202020204" pitchFamily="34" charset="0"/>
+              <a:buChar char="•"/>
+            </a:pPr>
+            <a:endParaRPr lang="fr-FR" sz="2000" dirty="0">
+              <a:latin typeface="Montserrat" panose="00000500000000000000" pitchFamily="2" charset="0"/>
+            </a:endParaRPr>
+          </a:p>
+          <a:p>
+            <a:pPr lvl="1">
+              <a:buFont typeface="Arial" panose="020B0604020202020204" pitchFamily="34" charset="0"/>
+              <a:buChar char="•"/>
+            </a:pPr>
+            <a:r>
+              <a:rPr lang="fr-FR" sz="2000" u="sng" dirty="0">
+                <a:latin typeface="Montserrat" panose="00000500000000000000" pitchFamily="2" charset="0"/>
+              </a:rPr>
+              <a:t>5 profils d’usagers</a:t>
+            </a:r>
+            <a:r>
+              <a:rPr lang="fr-FR" sz="2000" dirty="0">
+                <a:latin typeface="Montserrat" panose="00000500000000000000" pitchFamily="2" charset="0"/>
+              </a:rPr>
+              <a:t> : Client moyen, Client Satisfait, Client Exigent, Client fidèle et Client Frileux</a:t>
+            </a:r>
+          </a:p>
+          <a:p>
+            <a:pPr lvl="1">
+              <a:buFont typeface="Arial" panose="020B0604020202020204" pitchFamily="34" charset="0"/>
+              <a:buChar char="•"/>
+            </a:pPr>
+            <a:endParaRPr lang="fr-FR" sz="2000" dirty="0">
+              <a:latin typeface="Montserrat" panose="00000500000000000000" pitchFamily="2" charset="0"/>
+            </a:endParaRPr>
+          </a:p>
+          <a:p>
+            <a:pPr lvl="1">
+              <a:buFont typeface="Arial" panose="020B0604020202020204" pitchFamily="34" charset="0"/>
+              <a:buChar char="•"/>
+            </a:pPr>
+            <a:r>
+              <a:rPr lang="fr-FR" sz="2000" dirty="0">
+                <a:latin typeface="Montserrat" panose="00000500000000000000" pitchFamily="2" charset="0"/>
+              </a:rPr>
+              <a:t>Possibilité de mettre en place des stratégies différentes : </a:t>
+            </a:r>
+          </a:p>
+          <a:p>
+            <a:pPr lvl="2"/>
+            <a:r>
+              <a:rPr lang="fr-FR" sz="1800" dirty="0">
+                <a:latin typeface="Montserrat" panose="00000500000000000000" pitchFamily="2" charset="0"/>
+              </a:rPr>
+              <a:t>Fidéliser le client moyen</a:t>
+            </a:r>
+          </a:p>
+          <a:p>
+            <a:pPr lvl="2"/>
+            <a:r>
+              <a:rPr lang="fr-FR" sz="1800" dirty="0">
+                <a:latin typeface="Montserrat" panose="00000500000000000000" pitchFamily="2" charset="0"/>
+              </a:rPr>
+              <a:t>Récompenser le client fidèle</a:t>
+            </a:r>
+          </a:p>
+          <a:p>
+            <a:pPr lvl="2"/>
+            <a:r>
+              <a:rPr lang="fr-FR" sz="1800" dirty="0">
+                <a:latin typeface="Montserrat" panose="00000500000000000000" pitchFamily="2" charset="0"/>
+              </a:rPr>
+              <a:t>Faire passer le client frileux au stade de client moyen ou fidèle</a:t>
+            </a:r>
+          </a:p>
+          <a:p>
+            <a:pPr lvl="2"/>
+            <a:r>
+              <a:rPr lang="fr-FR" sz="1800" dirty="0">
+                <a:latin typeface="Montserrat" panose="00000500000000000000" pitchFamily="2" charset="0"/>
+              </a:rPr>
+              <a:t>Faire passer le client exigent au stade de client satisfait</a:t>
+            </a:r>
           </a:p>
         </p:txBody>
       </p:sp>
@@ -7177,10 +8129,113 @@
         </p:nvSpPr>
         <p:spPr/>
         <p:txBody>
-          <a:bodyPr/>
-          <a:lstStyle/>
-          <a:p>
-            <a:endParaRPr lang="fr-FR"/>
+          <a:bodyPr>
+            <a:normAutofit/>
+          </a:bodyPr>
+          <a:lstStyle/>
+          <a:p>
+            <a:pPr lvl="1">
+              <a:buFont typeface="Arial" panose="020B0604020202020204" pitchFamily="34" charset="0"/>
+              <a:buChar char="•"/>
+            </a:pPr>
+            <a:r>
+              <a:rPr lang="fr-FR" sz="2200" dirty="0">
+                <a:latin typeface="Montserrat" panose="00000500000000000000" pitchFamily="2" charset="0"/>
+              </a:rPr>
+              <a:t>Beaucoup de clients avec commande unique</a:t>
+            </a:r>
+          </a:p>
+          <a:p>
+            <a:pPr lvl="2"/>
+            <a:r>
+              <a:rPr lang="fr-FR" sz="1600" dirty="0">
+                <a:latin typeface="Montserrat" panose="00000500000000000000" pitchFamily="2" charset="0"/>
+              </a:rPr>
+              <a:t>Trouver une méthode pour « traquer » les clients pour avoir une meilleure estimation de la fréquence d’achat et de la récence</a:t>
+            </a:r>
+          </a:p>
+          <a:p>
+            <a:pPr lvl="3"/>
+            <a:r>
+              <a:rPr lang="fr-FR" sz="1600" dirty="0">
+                <a:latin typeface="Montserrat" panose="00000500000000000000" pitchFamily="2" charset="0"/>
+              </a:rPr>
+              <a:t>Utilisation de cookies</a:t>
+            </a:r>
+          </a:p>
+          <a:p>
+            <a:pPr lvl="3"/>
+            <a:r>
+              <a:rPr lang="fr-FR" sz="1600" dirty="0">
+                <a:latin typeface="Montserrat" panose="00000500000000000000" pitchFamily="2" charset="0"/>
+              </a:rPr>
+              <a:t>Création de compte</a:t>
+            </a:r>
+          </a:p>
+          <a:p>
+            <a:pPr lvl="3"/>
+            <a:endParaRPr lang="fr-FR" sz="1600" dirty="0">
+              <a:latin typeface="Montserrat" panose="00000500000000000000" pitchFamily="2" charset="0"/>
+            </a:endParaRPr>
+          </a:p>
+          <a:p>
+            <a:pPr lvl="1">
+              <a:buFont typeface="Arial" panose="020B0604020202020204" pitchFamily="34" charset="0"/>
+              <a:buChar char="•"/>
+            </a:pPr>
+            <a:r>
+              <a:rPr lang="fr-FR" sz="2200" dirty="0">
+                <a:latin typeface="Montserrat" panose="00000500000000000000" pitchFamily="2" charset="0"/>
+              </a:rPr>
+              <a:t>Peu d’informations démographiques</a:t>
+            </a:r>
+          </a:p>
+          <a:p>
+            <a:pPr lvl="2"/>
+            <a:r>
+              <a:rPr lang="fr-FR" sz="1600" dirty="0">
+                <a:latin typeface="Montserrat" panose="00000500000000000000" pitchFamily="2" charset="0"/>
+              </a:rPr>
+              <a:t>Utilisation la création de compte pour obtenir des informations comme le sexe et l’âge des clients</a:t>
+            </a:r>
+          </a:p>
+          <a:p>
+            <a:pPr marL="384048" lvl="2" indent="0">
+              <a:buNone/>
+            </a:pPr>
+            <a:endParaRPr lang="fr-FR" sz="1600" dirty="0">
+              <a:latin typeface="Montserrat" panose="00000500000000000000" pitchFamily="2" charset="0"/>
+            </a:endParaRPr>
+          </a:p>
+          <a:p>
+            <a:pPr lvl="1">
+              <a:buFont typeface="Arial" panose="020B0604020202020204" pitchFamily="34" charset="0"/>
+              <a:buChar char="•"/>
+            </a:pPr>
+            <a:r>
+              <a:rPr lang="fr-FR" sz="2200" dirty="0">
+                <a:latin typeface="Montserrat" panose="00000500000000000000" pitchFamily="2" charset="0"/>
+              </a:rPr>
+              <a:t>Possibilité de faire du NLP sur les commandes</a:t>
+            </a:r>
+          </a:p>
+          <a:p>
+            <a:pPr lvl="2"/>
+            <a:r>
+              <a:rPr lang="fr-FR" sz="1600" dirty="0">
+                <a:latin typeface="Montserrat" panose="00000500000000000000" pitchFamily="2" charset="0"/>
+              </a:rPr>
+              <a:t>Affiner le score de satisfaction</a:t>
+            </a:r>
+          </a:p>
+          <a:p>
+            <a:pPr lvl="2"/>
+            <a:r>
+              <a:rPr lang="fr-FR" sz="1600" dirty="0">
+                <a:latin typeface="Montserrat" panose="00000500000000000000" pitchFamily="2" charset="0"/>
+              </a:rPr>
+              <a:t>Récompenser les clients qui donnent un avis (pour augmenter le nombre d’avis) </a:t>
+            </a:r>
           </a:p>
         </p:txBody>
       </p:sp>
@@ -7229,6 +8284,20 @@
 <file path=ppt/slides/slide23.xml><?xml version="1.0" encoding="utf-8"?>
 <p:sld xmlns:a="http://schemas.openxmlformats.org/drawingml/2006/main" xmlns:r="http://schemas.openxmlformats.org/officeDocument/2006/relationships" xmlns:p="http://schemas.openxmlformats.org/presentationml/2006/main">
   <p:cSld>
+    <p:bg>
+      <p:bgPr>
+        <a:blipFill dpi="0" rotWithShape="1">
+          <a:blip r:embed="rId2">
+            <a:lum/>
+          </a:blip>
+          <a:srcRect/>
+          <a:stretch>
+            <a:fillRect t="-9000" b="-9000"/>
+          </a:stretch>
+        </a:blipFill>
+        <a:effectLst/>
+      </p:bgPr>
+    </p:bg>
     <p:spTree>
       <p:nvGrpSpPr>
         <p:cNvPr id="1" name=""/>
@@ -7269,6 +8338,44 @@
               <a:t>23</a:t>
             </a:fld>
             <a:endParaRPr lang="fr-FR"/>
+          </a:p>
+        </p:txBody>
+      </p:sp>
+      <p:sp>
+        <p:nvSpPr>
+          <p:cNvPr id="3" name="ZoneTexte 2">
+            <a:extLst>
+              <a:ext uri="{FF2B5EF4-FFF2-40B4-BE49-F238E27FC236}">
+                <a16:creationId xmlns:a16="http://schemas.microsoft.com/office/drawing/2014/main" id="{18FA5AEC-FA0B-49D3-869F-D9B4C1A6FD1F}"/>
+              </a:ext>
+            </a:extLst>
+          </p:cNvPr>
+          <p:cNvSpPr txBox="1"/>
+          <p:nvPr/>
+        </p:nvSpPr>
+        <p:spPr>
+          <a:xfrm flipH="1">
+            <a:off x="3615727" y="5201298"/>
+            <a:ext cx="5339253" cy="369332"/>
+          </a:xfrm>
+          <a:prstGeom prst="rect">
+            <a:avLst/>
+          </a:prstGeom>
+          <a:noFill/>
+        </p:spPr>
+        <p:txBody>
+          <a:bodyPr wrap="square" rtlCol="0">
+            <a:spAutoFit/>
+          </a:bodyPr>
+          <a:lstStyle/>
+          <a:p>
+            <a:pPr algn="ctr"/>
+            <a:r>
+              <a:rPr lang="fr-FR" b="1" dirty="0">
+                <a:latin typeface="Montserrat" panose="00000500000000000000" pitchFamily="2" charset="0"/>
+              </a:rPr>
+              <a:t>Merci pour votre attention !</a:t>
+            </a:r>
           </a:p>
         </p:txBody>
       </p:sp>

</xml_diff>

<commit_message>
last updated before oral presentation
</commit_message>
<xml_diff>
--- a/POlist_03_presentation.pptx
+++ b/POlist_03_presentation.pptx
@@ -295,6 +295,11 @@
       </a:defRPr>
     </a:lvl9pPr>
   </p:defaultTextStyle>
+  <p:extLst>
+    <p:ext uri="{EFAFB233-063F-42B5-8137-9DF3F51BA10A}">
+      <p15:sldGuideLst xmlns:p15="http://schemas.microsoft.com/office/powerpoint/2012/main"/>
+    </p:ext>
+  </p:extLst>
 </p:presentation>
 </file>
 
@@ -1156,6 +1161,75 @@
 </file>
 
 <file path=ppt/notesSlides/notesSlide5.xml><?xml version="1.0" encoding="utf-8"?>
+<p:notes xmlns:a="http://schemas.openxmlformats.org/drawingml/2006/main" xmlns:r="http://schemas.openxmlformats.org/officeDocument/2006/relationships" xmlns:p="http://schemas.openxmlformats.org/presentationml/2006/main">
+  <p:cSld>
+    <p:spTree>
+      <p:nvGrpSpPr>
+        <p:cNvPr id="1" name=""/>
+        <p:cNvGrpSpPr/>
+        <p:nvPr/>
+      </p:nvGrpSpPr>
+      <p:grpSpPr>
+        <a:xfrm>
+          <a:off x="0" y="0"/>
+          <a:ext cx="0" cy="0"/>
+          <a:chOff x="0" y="0"/>
+          <a:chExt cx="0" cy="0"/>
+        </a:xfrm>
+      </p:grpSpPr>
+      <p:sp>
+        <p:nvSpPr>
+          <p:cNvPr id="2" name="Espace réservé de l'image des diapositives 1"/>
+          <p:cNvSpPr>
+            <a:spLocks noGrp="1" noRot="1" noChangeAspect="1"/>
+          </p:cNvSpPr>
+          <p:nvPr>
+            <p:ph type="sldImg"/>
+          </p:nvPr>
+        </p:nvSpPr>
+        <p:spPr>
+          <a:xfrm>
+            <a:off x="381000" y="685800"/>
+            <a:ext cx="6096000" cy="3429000"/>
+          </a:xfrm>
+        </p:spPr>
+      </p:sp>
+      <p:sp>
+        <p:nvSpPr>
+          <p:cNvPr id="3" name="Espace réservé des notes 2"/>
+          <p:cNvSpPr>
+            <a:spLocks noGrp="1"/>
+          </p:cNvSpPr>
+          <p:nvPr>
+            <p:ph type="body" idx="1"/>
+          </p:nvPr>
+        </p:nvSpPr>
+        <p:spPr/>
+        <p:txBody>
+          <a:bodyPr/>
+          <a:lstStyle/>
+          <a:p>
+            <a:pPr marL="158750" indent="0">
+              <a:buNone/>
+            </a:pPr>
+            <a:endParaRPr lang="fr-FR" dirty="0"/>
+          </a:p>
+        </p:txBody>
+      </p:sp>
+    </p:spTree>
+    <p:extLst>
+      <p:ext uri="{BB962C8B-B14F-4D97-AF65-F5344CB8AC3E}">
+        <p14:creationId xmlns:p14="http://schemas.microsoft.com/office/powerpoint/2010/main" val="3021517937"/>
+      </p:ext>
+    </p:extLst>
+  </p:cSld>
+  <p:clrMapOvr>
+    <a:masterClrMapping/>
+  </p:clrMapOvr>
+</p:notes>
+</file>
+
+<file path=ppt/notesSlides/notesSlide6.xml><?xml version="1.0" encoding="utf-8"?>
 <p:notes xmlns:a="http://schemas.openxmlformats.org/drawingml/2006/main" xmlns:r="http://schemas.openxmlformats.org/officeDocument/2006/relationships" xmlns:p="http://schemas.openxmlformats.org/presentationml/2006/main" showMasterSp="0" showMasterPhAnim="0">
   <p:cSld>
     <p:spTree>
@@ -6979,7 +7053,7 @@
     <p:sldLayoutId id="2147483669" r:id="rId8"/>
     <p:sldLayoutId id="2147483671" r:id="rId9"/>
   </p:sldLayoutIdLst>
-  <p:hf sldNum="0" hdr="0" ftr="0" dt="0"/>
+  <p:hf hdr="0" dt="0"/>
   <p:txStyles>
     <p:titleStyle>
       <a:defPPr marR="0" lvl="0" algn="l" rtl="0">
@@ -7757,187 +7831,6 @@
           </a:p>
         </p:txBody>
       </p:sp>
-      <p:grpSp>
-        <p:nvGrpSpPr>
-          <p:cNvPr id="178" name="Google Shape;178;p28"/>
-          <p:cNvGrpSpPr/>
-          <p:nvPr/>
-        </p:nvGrpSpPr>
-        <p:grpSpPr>
-          <a:xfrm>
-            <a:off x="4167750" y="4704850"/>
-            <a:ext cx="808500" cy="92100"/>
-            <a:chOff x="3570750" y="4704850"/>
-            <a:chExt cx="808500" cy="92100"/>
-          </a:xfrm>
-        </p:grpSpPr>
-        <p:sp>
-          <p:nvSpPr>
-            <p:cNvPr id="179" name="Google Shape;179;p28"/>
-            <p:cNvSpPr/>
-            <p:nvPr/>
-          </p:nvSpPr>
-          <p:spPr>
-            <a:xfrm>
-              <a:off x="3570750" y="4704850"/>
-              <a:ext cx="92100" cy="92100"/>
-            </a:xfrm>
-            <a:prstGeom prst="ellipse">
-              <a:avLst/>
-            </a:prstGeom>
-            <a:solidFill>
-              <a:schemeClr val="lt1"/>
-            </a:solidFill>
-            <a:ln>
-              <a:noFill/>
-            </a:ln>
-          </p:spPr>
-          <p:txBody>
-            <a:bodyPr spcFirstLastPara="1" wrap="square" lIns="91425" tIns="91425" rIns="91425" bIns="91425" anchor="ctr" anchorCtr="0">
-              <a:noAutofit/>
-            </a:bodyPr>
-            <a:lstStyle/>
-            <a:p>
-              <a:pPr marL="0" lvl="0" indent="0" algn="l" rtl="0">
-                <a:spcBef>
-                  <a:spcPts val="0"/>
-                </a:spcBef>
-                <a:spcAft>
-                  <a:spcPts val="0"/>
-                </a:spcAft>
-                <a:buNone/>
-              </a:pPr>
-              <a:endParaRPr/>
-            </a:p>
-          </p:txBody>
-        </p:sp>
-        <p:sp>
-          <p:nvSpPr>
-            <p:cNvPr id="180" name="Google Shape;180;p28"/>
-            <p:cNvSpPr/>
-            <p:nvPr/>
-          </p:nvSpPr>
-          <p:spPr>
-            <a:xfrm>
-              <a:off x="3809550" y="4704850"/>
-              <a:ext cx="92100" cy="92100"/>
-            </a:xfrm>
-            <a:prstGeom prst="ellipse">
-              <a:avLst/>
-            </a:prstGeom>
-            <a:solidFill>
-              <a:schemeClr val="lt1">
-                <a:alpha val="50000"/>
-              </a:schemeClr>
-            </a:solidFill>
-            <a:ln>
-              <a:noFill/>
-            </a:ln>
-          </p:spPr>
-          <p:txBody>
-            <a:bodyPr spcFirstLastPara="1" wrap="square" lIns="91425" tIns="91425" rIns="91425" bIns="91425" anchor="ctr" anchorCtr="0">
-              <a:noAutofit/>
-            </a:bodyPr>
-            <a:lstStyle/>
-            <a:p>
-              <a:pPr marL="0" lvl="0" indent="0" algn="l" rtl="0">
-                <a:spcBef>
-                  <a:spcPts val="0"/>
-                </a:spcBef>
-                <a:spcAft>
-                  <a:spcPts val="0"/>
-                </a:spcAft>
-                <a:buNone/>
-              </a:pPr>
-              <a:endParaRPr/>
-            </a:p>
-          </p:txBody>
-        </p:sp>
-        <p:sp>
-          <p:nvSpPr>
-            <p:cNvPr id="181" name="Google Shape;181;p28"/>
-            <p:cNvSpPr/>
-            <p:nvPr/>
-          </p:nvSpPr>
-          <p:spPr>
-            <a:xfrm>
-              <a:off x="4048350" y="4704850"/>
-              <a:ext cx="92100" cy="92100"/>
-            </a:xfrm>
-            <a:prstGeom prst="ellipse">
-              <a:avLst/>
-            </a:prstGeom>
-            <a:solidFill>
-              <a:schemeClr val="lt1">
-                <a:alpha val="50000"/>
-              </a:schemeClr>
-            </a:solidFill>
-            <a:ln>
-              <a:noFill/>
-            </a:ln>
-          </p:spPr>
-          <p:txBody>
-            <a:bodyPr spcFirstLastPara="1" wrap="square" lIns="91425" tIns="91425" rIns="91425" bIns="91425" anchor="ctr" anchorCtr="0">
-              <a:noAutofit/>
-            </a:bodyPr>
-            <a:lstStyle/>
-            <a:p>
-              <a:pPr marL="0" lvl="0" indent="0" algn="l" rtl="0">
-                <a:spcBef>
-                  <a:spcPts val="0"/>
-                </a:spcBef>
-                <a:spcAft>
-                  <a:spcPts val="0"/>
-                </a:spcAft>
-                <a:buNone/>
-              </a:pPr>
-              <a:endParaRPr/>
-            </a:p>
-          </p:txBody>
-        </p:sp>
-        <p:sp>
-          <p:nvSpPr>
-            <p:cNvPr id="182" name="Google Shape;182;p28"/>
-            <p:cNvSpPr/>
-            <p:nvPr/>
-          </p:nvSpPr>
-          <p:spPr>
-            <a:xfrm>
-              <a:off x="4287150" y="4704850"/>
-              <a:ext cx="92100" cy="92100"/>
-            </a:xfrm>
-            <a:prstGeom prst="ellipse">
-              <a:avLst/>
-            </a:prstGeom>
-            <a:solidFill>
-              <a:schemeClr val="lt1">
-                <a:alpha val="50000"/>
-              </a:schemeClr>
-            </a:solidFill>
-            <a:ln>
-              <a:noFill/>
-            </a:ln>
-          </p:spPr>
-          <p:txBody>
-            <a:bodyPr spcFirstLastPara="1" wrap="square" lIns="91425" tIns="91425" rIns="91425" bIns="91425" anchor="ctr" anchorCtr="0">
-              <a:noAutofit/>
-            </a:bodyPr>
-            <a:lstStyle/>
-            <a:p>
-              <a:pPr marL="0" lvl="0" indent="0" algn="l" rtl="0">
-                <a:spcBef>
-                  <a:spcPts val="0"/>
-                </a:spcBef>
-                <a:spcAft>
-                  <a:spcPts val="0"/>
-                </a:spcAft>
-                <a:buNone/>
-              </a:pPr>
-              <a:endParaRPr/>
-            </a:p>
-          </p:txBody>
-        </p:sp>
-      </p:grpSp>
       <p:sp>
         <p:nvSpPr>
           <p:cNvPr id="183" name="Google Shape;183;p28"/>
@@ -8130,10 +8023,10 @@
       </p:sp>
       <p:pic>
         <p:nvPicPr>
-          <p:cNvPr id="5" name="Image 4">
+          <p:cNvPr id="6" name="Image 5">
             <a:extLst>
               <a:ext uri="{FF2B5EF4-FFF2-40B4-BE49-F238E27FC236}">
-                <a16:creationId xmlns:a16="http://schemas.microsoft.com/office/drawing/2014/main" id="{1D707E12-C9B4-4FC0-82CC-3A2E4DC7A3B4}"/>
+                <a16:creationId xmlns:a16="http://schemas.microsoft.com/office/drawing/2014/main" id="{712FB9EC-3B01-466C-B2F1-F0CB75F61111}"/>
               </a:ext>
             </a:extLst>
           </p:cNvPr>
@@ -8150,8 +8043,8 @@
         </p:blipFill>
         <p:spPr>
           <a:xfrm>
-            <a:off x="0" y="1271923"/>
-            <a:ext cx="9164299" cy="3600000"/>
+            <a:off x="0" y="1206923"/>
+            <a:ext cx="9144000" cy="3339483"/>
           </a:xfrm>
           <a:prstGeom prst="rect">
             <a:avLst/>
@@ -8249,10 +8142,10 @@
       </p:sp>
       <p:pic>
         <p:nvPicPr>
-          <p:cNvPr id="6" name="Image 5">
+          <p:cNvPr id="5" name="Image 4">
             <a:extLst>
               <a:ext uri="{FF2B5EF4-FFF2-40B4-BE49-F238E27FC236}">
-                <a16:creationId xmlns:a16="http://schemas.microsoft.com/office/drawing/2014/main" id="{DD4ABD58-1CE9-4043-8A2C-A42DF7B39C31}"/>
+                <a16:creationId xmlns:a16="http://schemas.microsoft.com/office/drawing/2014/main" id="{52F14F39-5824-45ED-8C00-A37098FD9B57}"/>
               </a:ext>
             </a:extLst>
           </p:cNvPr>
@@ -8269,8 +8162,8 @@
         </p:blipFill>
         <p:spPr>
           <a:xfrm>
-            <a:off x="105995" y="1179300"/>
-            <a:ext cx="8932009" cy="3600000"/>
+            <a:off x="163448" y="1276082"/>
+            <a:ext cx="8817104" cy="3406435"/>
           </a:xfrm>
           <a:prstGeom prst="rect">
             <a:avLst/>
@@ -8368,10 +8261,10 @@
       </p:sp>
       <p:pic>
         <p:nvPicPr>
-          <p:cNvPr id="5" name="Image 4">
+          <p:cNvPr id="6" name="Image 5">
             <a:extLst>
               <a:ext uri="{FF2B5EF4-FFF2-40B4-BE49-F238E27FC236}">
-                <a16:creationId xmlns:a16="http://schemas.microsoft.com/office/drawing/2014/main" id="{72614219-86CA-41A8-8306-0159CBF28E35}"/>
+                <a16:creationId xmlns:a16="http://schemas.microsoft.com/office/drawing/2014/main" id="{6938C0B4-01CF-4C21-9F11-A88086BF58B6}"/>
               </a:ext>
             </a:extLst>
           </p:cNvPr>
@@ -8388,8 +8281,8 @@
         </p:blipFill>
         <p:spPr>
           <a:xfrm>
-            <a:off x="103765" y="1179300"/>
-            <a:ext cx="8936470" cy="3600000"/>
+            <a:off x="37707" y="1200668"/>
+            <a:ext cx="9068586" cy="3368332"/>
           </a:xfrm>
           <a:prstGeom prst="rect">
             <a:avLst/>
@@ -8487,10 +8380,10 @@
       </p:sp>
       <p:pic>
         <p:nvPicPr>
-          <p:cNvPr id="6" name="Image 5">
+          <p:cNvPr id="5" name="Image 4">
             <a:extLst>
               <a:ext uri="{FF2B5EF4-FFF2-40B4-BE49-F238E27FC236}">
-                <a16:creationId xmlns:a16="http://schemas.microsoft.com/office/drawing/2014/main" id="{7C23CFF6-D19F-41E8-9D04-385908CC418B}"/>
+                <a16:creationId xmlns:a16="http://schemas.microsoft.com/office/drawing/2014/main" id="{C1223564-90D6-4525-AF88-26E748F77F60}"/>
               </a:ext>
             </a:extLst>
           </p:cNvPr>
@@ -8507,8 +8400,8 @@
         </p:blipFill>
         <p:spPr>
           <a:xfrm>
-            <a:off x="28973" y="1179300"/>
-            <a:ext cx="9086054" cy="3600000"/>
+            <a:off x="106293" y="1215909"/>
+            <a:ext cx="8931414" cy="3353091"/>
           </a:xfrm>
           <a:prstGeom prst="rect">
             <a:avLst/>
@@ -8606,10 +8499,10 @@
       </p:sp>
       <p:pic>
         <p:nvPicPr>
-          <p:cNvPr id="5" name="Image 4">
+          <p:cNvPr id="6" name="Image 5">
             <a:extLst>
               <a:ext uri="{FF2B5EF4-FFF2-40B4-BE49-F238E27FC236}">
-                <a16:creationId xmlns:a16="http://schemas.microsoft.com/office/drawing/2014/main" id="{C1382F31-0A9B-4223-8B5A-0C9402B42793}"/>
+                <a16:creationId xmlns:a16="http://schemas.microsoft.com/office/drawing/2014/main" id="{A728AB99-66C7-46C0-85D5-026CB17C1D81}"/>
               </a:ext>
             </a:extLst>
           </p:cNvPr>
@@ -8626,8 +8519,8 @@
         </p:blipFill>
         <p:spPr>
           <a:xfrm>
-            <a:off x="6146" y="1082414"/>
-            <a:ext cx="9131708" cy="3600000"/>
+            <a:off x="209172" y="1116841"/>
+            <a:ext cx="8725656" cy="3452159"/>
           </a:xfrm>
           <a:prstGeom prst="rect">
             <a:avLst/>
@@ -8743,224 +8636,6 @@
           </a:p>
         </p:txBody>
       </p:sp>
-      <p:grpSp>
-        <p:nvGrpSpPr>
-          <p:cNvPr id="4" name="Google Shape;258;p33">
-            <a:extLst>
-              <a:ext uri="{FF2B5EF4-FFF2-40B4-BE49-F238E27FC236}">
-                <a16:creationId xmlns:a16="http://schemas.microsoft.com/office/drawing/2014/main" id="{F73525D1-694E-4E82-95AA-3B5A3A932749}"/>
-              </a:ext>
-            </a:extLst>
-          </p:cNvPr>
-          <p:cNvGrpSpPr/>
-          <p:nvPr/>
-        </p:nvGrpSpPr>
-        <p:grpSpPr>
-          <a:xfrm>
-            <a:off x="4167750" y="4704850"/>
-            <a:ext cx="808500" cy="92100"/>
-            <a:chOff x="3570750" y="4704850"/>
-            <a:chExt cx="808500" cy="92100"/>
-          </a:xfrm>
-        </p:grpSpPr>
-        <p:sp>
-          <p:nvSpPr>
-            <p:cNvPr id="5" name="Google Shape;259;p33">
-              <a:extLst>
-                <a:ext uri="{FF2B5EF4-FFF2-40B4-BE49-F238E27FC236}">
-                  <a16:creationId xmlns:a16="http://schemas.microsoft.com/office/drawing/2014/main" id="{C96F8A24-2B8F-480C-AE16-880F91BB3278}"/>
-                </a:ext>
-              </a:extLst>
-            </p:cNvPr>
-            <p:cNvSpPr/>
-            <p:nvPr/>
-          </p:nvSpPr>
-          <p:spPr>
-            <a:xfrm>
-              <a:off x="3570750" y="4704850"/>
-              <a:ext cx="92100" cy="92100"/>
-            </a:xfrm>
-            <a:prstGeom prst="ellipse">
-              <a:avLst/>
-            </a:prstGeom>
-            <a:solidFill>
-              <a:schemeClr val="accent6">
-                <a:lumMod val="50000"/>
-              </a:schemeClr>
-            </a:solidFill>
-            <a:ln>
-              <a:solidFill>
-                <a:schemeClr val="bg1">
-                  <a:lumMod val="95000"/>
-                </a:schemeClr>
-              </a:solidFill>
-            </a:ln>
-          </p:spPr>
-          <p:txBody>
-            <a:bodyPr spcFirstLastPara="1" wrap="square" lIns="91425" tIns="91425" rIns="91425" bIns="91425" anchor="ctr" anchorCtr="0">
-              <a:noAutofit/>
-            </a:bodyPr>
-            <a:lstStyle/>
-            <a:p>
-              <a:pPr marL="0" lvl="0" indent="0" algn="l" rtl="0">
-                <a:spcBef>
-                  <a:spcPts val="0"/>
-                </a:spcBef>
-                <a:spcAft>
-                  <a:spcPts val="0"/>
-                </a:spcAft>
-                <a:buNone/>
-              </a:pPr>
-              <a:endParaRPr/>
-            </a:p>
-          </p:txBody>
-        </p:sp>
-        <p:sp>
-          <p:nvSpPr>
-            <p:cNvPr id="6" name="Google Shape;260;p33">
-              <a:extLst>
-                <a:ext uri="{FF2B5EF4-FFF2-40B4-BE49-F238E27FC236}">
-                  <a16:creationId xmlns:a16="http://schemas.microsoft.com/office/drawing/2014/main" id="{DC5B1191-456F-48FE-8171-F5BDF4D2F5FB}"/>
-                </a:ext>
-              </a:extLst>
-            </p:cNvPr>
-            <p:cNvSpPr/>
-            <p:nvPr/>
-          </p:nvSpPr>
-          <p:spPr>
-            <a:xfrm>
-              <a:off x="3809550" y="4704850"/>
-              <a:ext cx="92100" cy="92100"/>
-            </a:xfrm>
-            <a:prstGeom prst="ellipse">
-              <a:avLst/>
-            </a:prstGeom>
-            <a:solidFill>
-              <a:schemeClr val="accent6">
-                <a:lumMod val="50000"/>
-                <a:alpha val="50000"/>
-              </a:schemeClr>
-            </a:solidFill>
-            <a:ln>
-              <a:noFill/>
-            </a:ln>
-          </p:spPr>
-          <p:txBody>
-            <a:bodyPr spcFirstLastPara="1" wrap="square" lIns="91425" tIns="91425" rIns="91425" bIns="91425" anchor="ctr" anchorCtr="0">
-              <a:noAutofit/>
-            </a:bodyPr>
-            <a:lstStyle/>
-            <a:p>
-              <a:pPr marL="0" lvl="0" indent="0" algn="l" rtl="0">
-                <a:spcBef>
-                  <a:spcPts val="0"/>
-                </a:spcBef>
-                <a:spcAft>
-                  <a:spcPts val="0"/>
-                </a:spcAft>
-                <a:buNone/>
-              </a:pPr>
-              <a:endParaRPr dirty="0"/>
-            </a:p>
-          </p:txBody>
-        </p:sp>
-        <p:sp>
-          <p:nvSpPr>
-            <p:cNvPr id="7" name="Google Shape;261;p33">
-              <a:extLst>
-                <a:ext uri="{FF2B5EF4-FFF2-40B4-BE49-F238E27FC236}">
-                  <a16:creationId xmlns:a16="http://schemas.microsoft.com/office/drawing/2014/main" id="{E8FE5283-5A9D-4D18-BD24-EDFFFA5C1D2C}"/>
-                </a:ext>
-              </a:extLst>
-            </p:cNvPr>
-            <p:cNvSpPr/>
-            <p:nvPr/>
-          </p:nvSpPr>
-          <p:spPr>
-            <a:xfrm>
-              <a:off x="4048350" y="4704850"/>
-              <a:ext cx="92100" cy="92100"/>
-            </a:xfrm>
-            <a:prstGeom prst="ellipse">
-              <a:avLst/>
-            </a:prstGeom>
-            <a:solidFill>
-              <a:schemeClr val="lt1">
-                <a:alpha val="50000"/>
-              </a:schemeClr>
-            </a:solidFill>
-            <a:ln>
-              <a:noFill/>
-            </a:ln>
-          </p:spPr>
-          <p:txBody>
-            <a:bodyPr spcFirstLastPara="1" wrap="square" lIns="91425" tIns="91425" rIns="91425" bIns="91425" anchor="ctr" anchorCtr="0">
-              <a:noAutofit/>
-            </a:bodyPr>
-            <a:lstStyle/>
-            <a:p>
-              <a:pPr marL="0" lvl="0" indent="0" algn="l" rtl="0">
-                <a:spcBef>
-                  <a:spcPts val="0"/>
-                </a:spcBef>
-                <a:spcAft>
-                  <a:spcPts val="0"/>
-                </a:spcAft>
-                <a:buNone/>
-              </a:pPr>
-              <a:endParaRPr/>
-            </a:p>
-          </p:txBody>
-        </p:sp>
-        <p:sp>
-          <p:nvSpPr>
-            <p:cNvPr id="8" name="Google Shape;262;p33">
-              <a:extLst>
-                <a:ext uri="{FF2B5EF4-FFF2-40B4-BE49-F238E27FC236}">
-                  <a16:creationId xmlns:a16="http://schemas.microsoft.com/office/drawing/2014/main" id="{3BC95966-78A2-4FDF-B241-B930C4981771}"/>
-                </a:ext>
-              </a:extLst>
-            </p:cNvPr>
-            <p:cNvSpPr/>
-            <p:nvPr/>
-          </p:nvSpPr>
-          <p:spPr>
-            <a:xfrm>
-              <a:off x="4287150" y="4704850"/>
-              <a:ext cx="92100" cy="92100"/>
-            </a:xfrm>
-            <a:prstGeom prst="ellipse">
-              <a:avLst/>
-            </a:prstGeom>
-            <a:solidFill>
-              <a:schemeClr val="lt1">
-                <a:alpha val="50000"/>
-              </a:schemeClr>
-            </a:solidFill>
-            <a:ln>
-              <a:noFill/>
-            </a:ln>
-          </p:spPr>
-          <p:txBody>
-            <a:bodyPr spcFirstLastPara="1" wrap="square" lIns="91425" tIns="91425" rIns="91425" bIns="91425" anchor="ctr" anchorCtr="0">
-              <a:noAutofit/>
-            </a:bodyPr>
-            <a:lstStyle/>
-            <a:p>
-              <a:pPr marL="0" lvl="0" indent="0" algn="l" rtl="0">
-                <a:spcBef>
-                  <a:spcPts val="0"/>
-                </a:spcBef>
-                <a:spcAft>
-                  <a:spcPts val="0"/>
-                </a:spcAft>
-                <a:buNone/>
-              </a:pPr>
-              <a:endParaRPr/>
-            </a:p>
-          </p:txBody>
-        </p:sp>
-      </p:grpSp>
     </p:spTree>
     <p:extLst>
       <p:ext uri="{BB962C8B-B14F-4D97-AF65-F5344CB8AC3E}">
@@ -9040,7 +8715,7 @@
           <p:nvPr>
             <p:extLst>
               <p:ext uri="{D42A27DB-BD31-4B8C-83A1-F6EECF244321}">
-                <p14:modId xmlns:p14="http://schemas.microsoft.com/office/powerpoint/2010/main" val="3609469134"/>
+                <p14:modId xmlns:p14="http://schemas.microsoft.com/office/powerpoint/2010/main" val="2568870321"/>
               </p:ext>
             </p:extLst>
           </p:nvPr>
@@ -9180,7 +8855,7 @@
                       <a:pPr algn="ctr"/>
                       <a:r>
                         <a:rPr lang="fr-FR" dirty="0"/>
-                        <a:t>1</a:t>
+                        <a:t>C_1</a:t>
                       </a:r>
                     </a:p>
                   </a:txBody>
@@ -9257,7 +8932,7 @@
                       <a:pPr algn="ctr"/>
                       <a:r>
                         <a:rPr lang="fr-FR" dirty="0"/>
-                        <a:t>2</a:t>
+                        <a:t>C_2</a:t>
                       </a:r>
                     </a:p>
                   </a:txBody>
@@ -9334,7 +9009,7 @@
                       <a:pPr algn="ctr"/>
                       <a:r>
                         <a:rPr lang="fr-FR" dirty="0"/>
-                        <a:t>3</a:t>
+                        <a:t>C_3</a:t>
                       </a:r>
                     </a:p>
                   </a:txBody>
@@ -9411,7 +9086,7 @@
                       <a:pPr algn="ctr"/>
                       <a:r>
                         <a:rPr lang="fr-FR" dirty="0"/>
-                        <a:t>4</a:t>
+                        <a:t>C_4</a:t>
                       </a:r>
                     </a:p>
                   </a:txBody>
@@ -9693,10 +9368,10 @@
       </p:sp>
       <p:pic>
         <p:nvPicPr>
-          <p:cNvPr id="5" name="Image 4">
+          <p:cNvPr id="6" name="Image 5">
             <a:extLst>
               <a:ext uri="{FF2B5EF4-FFF2-40B4-BE49-F238E27FC236}">
-                <a16:creationId xmlns:a16="http://schemas.microsoft.com/office/drawing/2014/main" id="{B105D5AE-0A61-41DE-AED2-811FC8F21B19}"/>
+                <a16:creationId xmlns:a16="http://schemas.microsoft.com/office/drawing/2014/main" id="{C51CD423-48CF-438C-98C9-5D999AFFA331}"/>
               </a:ext>
             </a:extLst>
           </p:cNvPr>
@@ -9713,8 +9388,8 @@
         </p:blipFill>
         <p:spPr>
           <a:xfrm>
-            <a:off x="3313488" y="1043165"/>
-            <a:ext cx="5724186" cy="3057170"/>
+            <a:off x="3636523" y="1184271"/>
+            <a:ext cx="5195777" cy="2774957"/>
           </a:xfrm>
           <a:prstGeom prst="rect">
             <a:avLst/>
@@ -9856,7 +9531,7 @@
         </p:blipFill>
         <p:spPr>
           <a:xfrm>
-            <a:off x="3243911" y="2979300"/>
+            <a:off x="3243910" y="2979300"/>
             <a:ext cx="5815581" cy="1938527"/>
           </a:xfrm>
           <a:prstGeom prst="rect">
@@ -9866,10 +9541,10 @@
       </p:pic>
       <p:pic>
         <p:nvPicPr>
-          <p:cNvPr id="9" name="Image 8">
+          <p:cNvPr id="5" name="Image 4">
             <a:extLst>
               <a:ext uri="{FF2B5EF4-FFF2-40B4-BE49-F238E27FC236}">
-                <a16:creationId xmlns:a16="http://schemas.microsoft.com/office/drawing/2014/main" id="{CA996ABB-18E4-484D-BA54-2323313A48DF}"/>
+                <a16:creationId xmlns:a16="http://schemas.microsoft.com/office/drawing/2014/main" id="{96BBA347-9DFA-452A-9563-95C7F22A5799}"/>
               </a:ext>
             </a:extLst>
           </p:cNvPr>
@@ -9886,8 +9561,8 @@
         </p:blipFill>
         <p:spPr>
           <a:xfrm>
-            <a:off x="3681040" y="225673"/>
-            <a:ext cx="4941322" cy="2639058"/>
+            <a:off x="3532546" y="131908"/>
+            <a:ext cx="5238307" cy="2797672"/>
           </a:xfrm>
           <a:prstGeom prst="rect">
             <a:avLst/>
@@ -10062,10 +9737,10 @@
       </p:sp>
       <p:pic>
         <p:nvPicPr>
-          <p:cNvPr id="7" name="Image 6">
+          <p:cNvPr id="5" name="Image 4">
             <a:extLst>
               <a:ext uri="{FF2B5EF4-FFF2-40B4-BE49-F238E27FC236}">
-                <a16:creationId xmlns:a16="http://schemas.microsoft.com/office/drawing/2014/main" id="{940D07EC-CCE8-4AC9-9850-F8CDE035DF92}"/>
+                <a16:creationId xmlns:a16="http://schemas.microsoft.com/office/drawing/2014/main" id="{B82F6104-D921-4B85-9A84-FBE2CF53B59A}"/>
               </a:ext>
             </a:extLst>
           </p:cNvPr>
@@ -10082,8 +9757,8 @@
         </p:blipFill>
         <p:spPr>
           <a:xfrm>
-            <a:off x="3484067" y="1197935"/>
-            <a:ext cx="5418928" cy="2894138"/>
+            <a:off x="3119700" y="1111145"/>
+            <a:ext cx="5953049" cy="3179401"/>
           </a:xfrm>
           <a:prstGeom prst="rect">
             <a:avLst/>
@@ -10136,58 +9811,6 @@
           <a:chExt cx="0" cy="0"/>
         </a:xfrm>
       </p:grpSpPr>
-      <p:sp>
-        <p:nvSpPr>
-          <p:cNvPr id="227" name="Google Shape;227;p32"/>
-          <p:cNvSpPr txBox="1">
-            <a:spLocks noGrp="1"/>
-          </p:cNvSpPr>
-          <p:nvPr>
-            <p:ph type="subTitle" idx="4294967295"/>
-          </p:nvPr>
-        </p:nvSpPr>
-        <p:spPr>
-          <a:xfrm>
-            <a:off x="719999" y="540000"/>
-            <a:ext cx="2611535" cy="323100"/>
-          </a:xfrm>
-          <a:prstGeom prst="rect">
-            <a:avLst/>
-          </a:prstGeom>
-        </p:spPr>
-        <p:txBody>
-          <a:bodyPr spcFirstLastPara="1" wrap="square" lIns="91425" tIns="91425" rIns="91425" bIns="91425" anchor="t" anchorCtr="0">
-            <a:noAutofit/>
-          </a:bodyPr>
-          <a:lstStyle/>
-          <a:p>
-            <a:pPr marL="0" lvl="0" indent="0" algn="l" rtl="0">
-              <a:spcBef>
-                <a:spcPts val="0"/>
-              </a:spcBef>
-              <a:spcAft>
-                <a:spcPts val="1600"/>
-              </a:spcAft>
-              <a:buNone/>
-            </a:pPr>
-            <a:r>
-              <a:rPr lang="en" sz="800" dirty="0">
-                <a:latin typeface="Montserrat"/>
-                <a:ea typeface="Montserrat"/>
-                <a:cs typeface="Montserrat"/>
-                <a:sym typeface="Montserrat"/>
-              </a:rPr>
-              <a:t>Cécile Guillot – Ingénieure Machine Learning</a:t>
-            </a:r>
-            <a:endParaRPr sz="800" dirty="0">
-              <a:latin typeface="Montserrat"/>
-              <a:ea typeface="Montserrat"/>
-              <a:cs typeface="Montserrat"/>
-              <a:sym typeface="Montserrat"/>
-            </a:endParaRPr>
-          </a:p>
-        </p:txBody>
-      </p:sp>
       <p:sp>
         <p:nvSpPr>
           <p:cNvPr id="228" name="Google Shape;228;p32"/>
@@ -10654,187 +10277,6 @@
           </a:ln>
         </p:spPr>
       </p:cxnSp>
-      <p:grpSp>
-        <p:nvGrpSpPr>
-          <p:cNvPr id="241" name="Google Shape;241;p32"/>
-          <p:cNvGrpSpPr/>
-          <p:nvPr/>
-        </p:nvGrpSpPr>
-        <p:grpSpPr>
-          <a:xfrm>
-            <a:off x="4167750" y="4704850"/>
-            <a:ext cx="808500" cy="92100"/>
-            <a:chOff x="3570750" y="4704850"/>
-            <a:chExt cx="808500" cy="92100"/>
-          </a:xfrm>
-        </p:grpSpPr>
-        <p:sp>
-          <p:nvSpPr>
-            <p:cNvPr id="242" name="Google Shape;242;p32"/>
-            <p:cNvSpPr/>
-            <p:nvPr/>
-          </p:nvSpPr>
-          <p:spPr>
-            <a:xfrm>
-              <a:off x="3570750" y="4704850"/>
-              <a:ext cx="92100" cy="92100"/>
-            </a:xfrm>
-            <a:prstGeom prst="ellipse">
-              <a:avLst/>
-            </a:prstGeom>
-            <a:solidFill>
-              <a:schemeClr val="lt1"/>
-            </a:solidFill>
-            <a:ln>
-              <a:noFill/>
-            </a:ln>
-          </p:spPr>
-          <p:txBody>
-            <a:bodyPr spcFirstLastPara="1" wrap="square" lIns="91425" tIns="91425" rIns="91425" bIns="91425" anchor="ctr" anchorCtr="0">
-              <a:noAutofit/>
-            </a:bodyPr>
-            <a:lstStyle/>
-            <a:p>
-              <a:pPr marL="0" lvl="0" indent="0" algn="l" rtl="0">
-                <a:spcBef>
-                  <a:spcPts val="0"/>
-                </a:spcBef>
-                <a:spcAft>
-                  <a:spcPts val="0"/>
-                </a:spcAft>
-                <a:buNone/>
-              </a:pPr>
-              <a:endParaRPr/>
-            </a:p>
-          </p:txBody>
-        </p:sp>
-        <p:sp>
-          <p:nvSpPr>
-            <p:cNvPr id="243" name="Google Shape;243;p32"/>
-            <p:cNvSpPr/>
-            <p:nvPr/>
-          </p:nvSpPr>
-          <p:spPr>
-            <a:xfrm>
-              <a:off x="3809550" y="4704850"/>
-              <a:ext cx="92100" cy="92100"/>
-            </a:xfrm>
-            <a:prstGeom prst="ellipse">
-              <a:avLst/>
-            </a:prstGeom>
-            <a:solidFill>
-              <a:schemeClr val="lt1">
-                <a:alpha val="50000"/>
-              </a:schemeClr>
-            </a:solidFill>
-            <a:ln>
-              <a:noFill/>
-            </a:ln>
-          </p:spPr>
-          <p:txBody>
-            <a:bodyPr spcFirstLastPara="1" wrap="square" lIns="91425" tIns="91425" rIns="91425" bIns="91425" anchor="ctr" anchorCtr="0">
-              <a:noAutofit/>
-            </a:bodyPr>
-            <a:lstStyle/>
-            <a:p>
-              <a:pPr marL="0" lvl="0" indent="0" algn="l" rtl="0">
-                <a:spcBef>
-                  <a:spcPts val="0"/>
-                </a:spcBef>
-                <a:spcAft>
-                  <a:spcPts val="0"/>
-                </a:spcAft>
-                <a:buNone/>
-              </a:pPr>
-              <a:endParaRPr/>
-            </a:p>
-          </p:txBody>
-        </p:sp>
-        <p:sp>
-          <p:nvSpPr>
-            <p:cNvPr id="244" name="Google Shape;244;p32"/>
-            <p:cNvSpPr/>
-            <p:nvPr/>
-          </p:nvSpPr>
-          <p:spPr>
-            <a:xfrm>
-              <a:off x="4048350" y="4704850"/>
-              <a:ext cx="92100" cy="92100"/>
-            </a:xfrm>
-            <a:prstGeom prst="ellipse">
-              <a:avLst/>
-            </a:prstGeom>
-            <a:solidFill>
-              <a:schemeClr val="lt1">
-                <a:alpha val="50000"/>
-              </a:schemeClr>
-            </a:solidFill>
-            <a:ln>
-              <a:noFill/>
-            </a:ln>
-          </p:spPr>
-          <p:txBody>
-            <a:bodyPr spcFirstLastPara="1" wrap="square" lIns="91425" tIns="91425" rIns="91425" bIns="91425" anchor="ctr" anchorCtr="0">
-              <a:noAutofit/>
-            </a:bodyPr>
-            <a:lstStyle/>
-            <a:p>
-              <a:pPr marL="0" lvl="0" indent="0" algn="l" rtl="0">
-                <a:spcBef>
-                  <a:spcPts val="0"/>
-                </a:spcBef>
-                <a:spcAft>
-                  <a:spcPts val="0"/>
-                </a:spcAft>
-                <a:buNone/>
-              </a:pPr>
-              <a:endParaRPr/>
-            </a:p>
-          </p:txBody>
-        </p:sp>
-        <p:sp>
-          <p:nvSpPr>
-            <p:cNvPr id="245" name="Google Shape;245;p32"/>
-            <p:cNvSpPr/>
-            <p:nvPr/>
-          </p:nvSpPr>
-          <p:spPr>
-            <a:xfrm>
-              <a:off x="4287150" y="4704850"/>
-              <a:ext cx="92100" cy="92100"/>
-            </a:xfrm>
-            <a:prstGeom prst="ellipse">
-              <a:avLst/>
-            </a:prstGeom>
-            <a:solidFill>
-              <a:schemeClr val="lt1">
-                <a:alpha val="50000"/>
-              </a:schemeClr>
-            </a:solidFill>
-            <a:ln>
-              <a:noFill/>
-            </a:ln>
-          </p:spPr>
-          <p:txBody>
-            <a:bodyPr spcFirstLastPara="1" wrap="square" lIns="91425" tIns="91425" rIns="91425" bIns="91425" anchor="ctr" anchorCtr="0">
-              <a:noAutofit/>
-            </a:bodyPr>
-            <a:lstStyle/>
-            <a:p>
-              <a:pPr marL="0" lvl="0" indent="0" algn="l" rtl="0">
-                <a:spcBef>
-                  <a:spcPts val="0"/>
-                </a:spcBef>
-                <a:spcAft>
-                  <a:spcPts val="0"/>
-                </a:spcAft>
-                <a:buNone/>
-              </a:pPr>
-              <a:endParaRPr/>
-            </a:p>
-          </p:txBody>
-        </p:sp>
-      </p:grpSp>
       <p:sp>
         <p:nvSpPr>
           <p:cNvPr id="246" name="Google Shape;246;p32"/>
@@ -11317,7 +10759,7 @@
         </p:nvSpPr>
         <p:spPr>
           <a:xfrm>
-            <a:off x="65171" y="3474924"/>
+            <a:off x="65171" y="3897670"/>
             <a:ext cx="2179144" cy="1118342"/>
           </a:xfrm>
         </p:spPr>
@@ -11340,7 +10782,7 @@
             </a:pPr>
             <a:r>
               <a:rPr lang="fr-FR" dirty="0"/>
-              <a:t>Plus de 8 achats</a:t>
+              <a:t>Plus de 6 achats</a:t>
             </a:r>
           </a:p>
           <a:p>
@@ -11350,7 +10792,7 @@
             </a:pPr>
             <a:r>
               <a:rPr lang="fr-FR" dirty="0"/>
-              <a:t>Faible valeur</a:t>
+              <a:t>Achat de petites valeurs (&gt; 20 Réaux)</a:t>
             </a:r>
           </a:p>
           <a:p>
@@ -11360,7 +10802,7 @@
             </a:pPr>
             <a:r>
               <a:rPr lang="fr-FR" dirty="0"/>
-              <a:t>4.16/5 </a:t>
+              <a:t>4.17/5 </a:t>
             </a:r>
           </a:p>
           <a:p>
@@ -11605,8 +11047,8 @@
         </p:nvSpPr>
         <p:spPr>
           <a:xfrm>
-            <a:off x="2392856" y="3474924"/>
-            <a:ext cx="2179144" cy="1118342"/>
+            <a:off x="2244314" y="3902492"/>
+            <a:ext cx="2327685" cy="1118342"/>
           </a:xfrm>
           <a:prstGeom prst="rect">
             <a:avLst/>
@@ -11874,7 +11316,7 @@
             </a:pPr>
             <a:r>
               <a:rPr lang="fr-FR" u="sng" dirty="0"/>
-              <a:t>Le mécontent</a:t>
+              <a:t>Le dépensier</a:t>
             </a:r>
           </a:p>
           <a:p>
@@ -11884,7 +11326,7 @@
             </a:pPr>
             <a:r>
               <a:rPr lang="fr-FR" dirty="0"/>
-              <a:t>Plus de 2 achats</a:t>
+              <a:t>Un achat</a:t>
             </a:r>
           </a:p>
           <a:p>
@@ -11894,7 +11336,7 @@
             </a:pPr>
             <a:r>
               <a:rPr lang="fr-FR" dirty="0"/>
-              <a:t>Valeur moyenne</a:t>
+              <a:t>Achats de fortes valeurs (&lt;150 Réaux)</a:t>
             </a:r>
           </a:p>
           <a:p>
@@ -11904,7 +11346,7 @@
             </a:pPr>
             <a:r>
               <a:rPr lang="fr-FR" dirty="0"/>
-              <a:t>3.96/5 </a:t>
+              <a:t>4.01/5 </a:t>
             </a:r>
           </a:p>
           <a:p>
@@ -11932,8 +11374,8 @@
         </p:nvSpPr>
         <p:spPr>
           <a:xfrm>
-            <a:off x="4678326" y="3474924"/>
-            <a:ext cx="2179144" cy="1118342"/>
+            <a:off x="4433186" y="3935668"/>
+            <a:ext cx="2573078" cy="1372486"/>
           </a:xfrm>
           <a:prstGeom prst="rect">
             <a:avLst/>
@@ -12200,8 +11642,8 @@
               <a:buNone/>
             </a:pPr>
             <a:r>
-              <a:rPr lang="fr-FR" u="sng" dirty="0"/>
-              <a:t>Le client moyen</a:t>
+              <a:rPr lang="fr-FR" sz="1200" u="sng" dirty="0"/>
+              <a:t>L’adepte des produits cosmétiques</a:t>
             </a:r>
           </a:p>
           <a:p>
@@ -12210,8 +11652,8 @@
               <a:buChar char="•"/>
             </a:pPr>
             <a:r>
-              <a:rPr lang="fr-FR" dirty="0"/>
-              <a:t>Plus de 2 achats</a:t>
+              <a:rPr lang="fr-FR" sz="1200" dirty="0"/>
+              <a:t>Un achat</a:t>
             </a:r>
           </a:p>
           <a:p>
@@ -12220,8 +11662,8 @@
               <a:buChar char="•"/>
             </a:pPr>
             <a:r>
-              <a:rPr lang="fr-FR" dirty="0"/>
-              <a:t>Valeur moyenne</a:t>
+              <a:rPr lang="fr-FR" sz="1200" dirty="0"/>
+              <a:t>Achat de valeurs moyennes (environ 100 Réaux)</a:t>
             </a:r>
           </a:p>
           <a:p>
@@ -12230,8 +11672,8 @@
               <a:buChar char="•"/>
             </a:pPr>
             <a:r>
-              <a:rPr lang="fr-FR" dirty="0"/>
-              <a:t>4.36/5 </a:t>
+              <a:rPr lang="fr-FR" sz="1200" dirty="0"/>
+              <a:t>4.35/5 </a:t>
             </a:r>
           </a:p>
           <a:p>
@@ -12239,7 +11681,7 @@
               <a:buFontTx/>
               <a:buChar char="-"/>
             </a:pPr>
-            <a:endParaRPr lang="fr-FR" dirty="0"/>
+            <a:endParaRPr lang="fr-FR" sz="1200" dirty="0"/>
           </a:p>
         </p:txBody>
       </p:sp>
@@ -12259,7 +11701,7 @@
         </p:nvSpPr>
         <p:spPr>
           <a:xfrm>
-            <a:off x="6899685" y="3455281"/>
+            <a:off x="6899685" y="3935668"/>
             <a:ext cx="2179144" cy="1118342"/>
           </a:xfrm>
           <a:prstGeom prst="rect">
@@ -12527,8 +11969,8 @@
               <a:buNone/>
             </a:pPr>
             <a:r>
-              <a:rPr lang="fr-FR" u="sng" dirty="0"/>
-              <a:t>Le dépensier</a:t>
+              <a:rPr lang="fr-FR" sz="1200" u="sng" dirty="0"/>
+              <a:t>Le client moyen</a:t>
             </a:r>
           </a:p>
           <a:p>
@@ -12537,8 +11979,8 @@
               <a:buChar char="•"/>
             </a:pPr>
             <a:r>
-              <a:rPr lang="fr-FR" dirty="0"/>
-              <a:t>Plus de 2 achats</a:t>
+              <a:rPr lang="fr-FR" sz="1200" dirty="0"/>
+              <a:t>Un achat</a:t>
             </a:r>
           </a:p>
           <a:p>
@@ -12547,8 +11989,8 @@
               <a:buChar char="•"/>
             </a:pPr>
             <a:r>
-              <a:rPr lang="fr-FR" dirty="0"/>
-              <a:t>Forte valeur</a:t>
+              <a:rPr lang="fr-FR" sz="1200" dirty="0"/>
+              <a:t>Achat de valeurs moyennes</a:t>
             </a:r>
           </a:p>
           <a:p>
@@ -12557,8 +11999,8 @@
               <a:buChar char="•"/>
             </a:pPr>
             <a:r>
-              <a:rPr lang="fr-FR" dirty="0"/>
-              <a:t>4.15/5 </a:t>
+              <a:rPr lang="fr-FR" sz="1200" dirty="0"/>
+              <a:t>4.18/5 </a:t>
             </a:r>
           </a:p>
           <a:p>
@@ -12566,7 +12008,7 @@
               <a:buFontTx/>
               <a:buChar char="-"/>
             </a:pPr>
-            <a:endParaRPr lang="fr-FR" dirty="0"/>
+            <a:endParaRPr lang="fr-FR" sz="1200" dirty="0"/>
           </a:p>
         </p:txBody>
       </p:sp>
@@ -12688,7 +12130,7 @@
           <a:p>
             <a:r>
               <a:rPr lang="fr-FR" sz="1800" dirty="0"/>
-              <a:t>4 profils de clients : Client fidèle, exigent, moyen et dépensier</a:t>
+              <a:t>4 profils de clients : Client fidèle, dépensier, adepte de cosmétiques et moyen</a:t>
             </a:r>
           </a:p>
           <a:p>
@@ -12788,7 +12230,7 @@
         <p:spPr>
           <a:xfrm>
             <a:off x="705823" y="1804725"/>
-            <a:ext cx="7518600" cy="2972837"/>
+            <a:ext cx="8225526" cy="2972837"/>
           </a:xfrm>
         </p:spPr>
         <p:txBody>
@@ -12911,187 +12353,6 @@
           <a:chExt cx="0" cy="0"/>
         </a:xfrm>
       </p:grpSpPr>
-      <p:grpSp>
-        <p:nvGrpSpPr>
-          <p:cNvPr id="1059" name="Google Shape;1059;p58"/>
-          <p:cNvGrpSpPr/>
-          <p:nvPr/>
-        </p:nvGrpSpPr>
-        <p:grpSpPr>
-          <a:xfrm>
-            <a:off x="4167750" y="4704850"/>
-            <a:ext cx="808500" cy="92100"/>
-            <a:chOff x="3570750" y="4704850"/>
-            <a:chExt cx="808500" cy="92100"/>
-          </a:xfrm>
-        </p:grpSpPr>
-        <p:sp>
-          <p:nvSpPr>
-            <p:cNvPr id="1060" name="Google Shape;1060;p58"/>
-            <p:cNvSpPr/>
-            <p:nvPr/>
-          </p:nvSpPr>
-          <p:spPr>
-            <a:xfrm>
-              <a:off x="3570750" y="4704850"/>
-              <a:ext cx="92100" cy="92100"/>
-            </a:xfrm>
-            <a:prstGeom prst="ellipse">
-              <a:avLst/>
-            </a:prstGeom>
-            <a:solidFill>
-              <a:schemeClr val="lt1">
-                <a:alpha val="51340"/>
-              </a:schemeClr>
-            </a:solidFill>
-            <a:ln>
-              <a:noFill/>
-            </a:ln>
-          </p:spPr>
-          <p:txBody>
-            <a:bodyPr spcFirstLastPara="1" wrap="square" lIns="91425" tIns="91425" rIns="91425" bIns="91425" anchor="ctr" anchorCtr="0">
-              <a:noAutofit/>
-            </a:bodyPr>
-            <a:lstStyle/>
-            <a:p>
-              <a:pPr marL="0" lvl="0" indent="0" algn="l" rtl="0">
-                <a:spcBef>
-                  <a:spcPts val="0"/>
-                </a:spcBef>
-                <a:spcAft>
-                  <a:spcPts val="0"/>
-                </a:spcAft>
-                <a:buNone/>
-              </a:pPr>
-              <a:endParaRPr/>
-            </a:p>
-          </p:txBody>
-        </p:sp>
-        <p:sp>
-          <p:nvSpPr>
-            <p:cNvPr id="1061" name="Google Shape;1061;p58"/>
-            <p:cNvSpPr/>
-            <p:nvPr/>
-          </p:nvSpPr>
-          <p:spPr>
-            <a:xfrm>
-              <a:off x="3809550" y="4704850"/>
-              <a:ext cx="92100" cy="92100"/>
-            </a:xfrm>
-            <a:prstGeom prst="ellipse">
-              <a:avLst/>
-            </a:prstGeom>
-            <a:solidFill>
-              <a:schemeClr val="lt1">
-                <a:alpha val="50000"/>
-              </a:schemeClr>
-            </a:solidFill>
-            <a:ln>
-              <a:noFill/>
-            </a:ln>
-          </p:spPr>
-          <p:txBody>
-            <a:bodyPr spcFirstLastPara="1" wrap="square" lIns="91425" tIns="91425" rIns="91425" bIns="91425" anchor="ctr" anchorCtr="0">
-              <a:noAutofit/>
-            </a:bodyPr>
-            <a:lstStyle/>
-            <a:p>
-              <a:pPr marL="0" lvl="0" indent="0" algn="l" rtl="0">
-                <a:spcBef>
-                  <a:spcPts val="0"/>
-                </a:spcBef>
-                <a:spcAft>
-                  <a:spcPts val="0"/>
-                </a:spcAft>
-                <a:buNone/>
-              </a:pPr>
-              <a:endParaRPr/>
-            </a:p>
-          </p:txBody>
-        </p:sp>
-        <p:sp>
-          <p:nvSpPr>
-            <p:cNvPr id="1062" name="Google Shape;1062;p58"/>
-            <p:cNvSpPr/>
-            <p:nvPr/>
-          </p:nvSpPr>
-          <p:spPr>
-            <a:xfrm>
-              <a:off x="4048350" y="4704850"/>
-              <a:ext cx="92100" cy="92100"/>
-            </a:xfrm>
-            <a:prstGeom prst="ellipse">
-              <a:avLst/>
-            </a:prstGeom>
-            <a:solidFill>
-              <a:schemeClr val="lt1">
-                <a:alpha val="50000"/>
-              </a:schemeClr>
-            </a:solidFill>
-            <a:ln>
-              <a:noFill/>
-            </a:ln>
-          </p:spPr>
-          <p:txBody>
-            <a:bodyPr spcFirstLastPara="1" wrap="square" lIns="91425" tIns="91425" rIns="91425" bIns="91425" anchor="ctr" anchorCtr="0">
-              <a:noAutofit/>
-            </a:bodyPr>
-            <a:lstStyle/>
-            <a:p>
-              <a:pPr marL="0" lvl="0" indent="0" algn="l" rtl="0">
-                <a:spcBef>
-                  <a:spcPts val="0"/>
-                </a:spcBef>
-                <a:spcAft>
-                  <a:spcPts val="0"/>
-                </a:spcAft>
-                <a:buNone/>
-              </a:pPr>
-              <a:endParaRPr/>
-            </a:p>
-          </p:txBody>
-        </p:sp>
-        <p:sp>
-          <p:nvSpPr>
-            <p:cNvPr id="1063" name="Google Shape;1063;p58"/>
-            <p:cNvSpPr/>
-            <p:nvPr/>
-          </p:nvSpPr>
-          <p:spPr>
-            <a:xfrm>
-              <a:off x="4287150" y="4704850"/>
-              <a:ext cx="92100" cy="92100"/>
-            </a:xfrm>
-            <a:prstGeom prst="ellipse">
-              <a:avLst/>
-            </a:prstGeom>
-            <a:solidFill>
-              <a:schemeClr val="lt1"/>
-            </a:solidFill>
-            <a:ln>
-              <a:noFill/>
-            </a:ln>
-          </p:spPr>
-          <p:txBody>
-            <a:bodyPr spcFirstLastPara="1" wrap="square" lIns="91425" tIns="91425" rIns="91425" bIns="91425" anchor="ctr" anchorCtr="0">
-              <a:noAutofit/>
-            </a:bodyPr>
-            <a:lstStyle/>
-            <a:p>
-              <a:pPr marL="0" lvl="0" indent="0" algn="l" rtl="0">
-                <a:spcBef>
-                  <a:spcPts val="0"/>
-                </a:spcBef>
-                <a:spcAft>
-                  <a:spcPts val="0"/>
-                </a:spcAft>
-                <a:buNone/>
-              </a:pPr>
-              <a:endParaRPr/>
-            </a:p>
-          </p:txBody>
-        </p:sp>
-      </p:grpSp>
       <p:sp>
         <p:nvSpPr>
           <p:cNvPr id="1064" name="Google Shape;1064;p58"/>
@@ -14738,58 +13999,6 @@
       </p:sp>
       <p:sp>
         <p:nvSpPr>
-          <p:cNvPr id="255" name="Google Shape;255;p33"/>
-          <p:cNvSpPr txBox="1">
-            <a:spLocks noGrp="1"/>
-          </p:cNvSpPr>
-          <p:nvPr>
-            <p:ph type="subTitle" idx="4294967295"/>
-          </p:nvPr>
-        </p:nvSpPr>
-        <p:spPr>
-          <a:xfrm>
-            <a:off x="719999" y="540000"/>
-            <a:ext cx="2565895" cy="323100"/>
-          </a:xfrm>
-          <a:prstGeom prst="rect">
-            <a:avLst/>
-          </a:prstGeom>
-        </p:spPr>
-        <p:txBody>
-          <a:bodyPr spcFirstLastPara="1" wrap="square" lIns="91425" tIns="91425" rIns="91425" bIns="91425" anchor="t" anchorCtr="0">
-            <a:noAutofit/>
-          </a:bodyPr>
-          <a:lstStyle/>
-          <a:p>
-            <a:pPr marL="0" lvl="0" indent="0" algn="l" rtl="0">
-              <a:spcBef>
-                <a:spcPts val="0"/>
-              </a:spcBef>
-              <a:spcAft>
-                <a:spcPts val="1600"/>
-              </a:spcAft>
-              <a:buNone/>
-            </a:pPr>
-            <a:r>
-              <a:rPr lang="en" sz="800" dirty="0">
-                <a:latin typeface="Montserrat"/>
-                <a:ea typeface="Montserrat"/>
-                <a:cs typeface="Montserrat"/>
-                <a:sym typeface="Montserrat"/>
-              </a:rPr>
-              <a:t>Cécile Guillot – Ingénieure Machine Learning</a:t>
-            </a:r>
-            <a:endParaRPr sz="800" dirty="0">
-              <a:latin typeface="Montserrat"/>
-              <a:ea typeface="Montserrat"/>
-              <a:cs typeface="Montserrat"/>
-              <a:sym typeface="Montserrat"/>
-            </a:endParaRPr>
-          </a:p>
-        </p:txBody>
-      </p:sp>
-      <p:sp>
-        <p:nvSpPr>
           <p:cNvPr id="256" name="Google Shape;256;p33"/>
           <p:cNvSpPr txBox="1">
             <a:spLocks noGrp="1"/>
@@ -14824,189 +14033,6 @@
           </a:p>
         </p:txBody>
       </p:sp>
-      <p:grpSp>
-        <p:nvGrpSpPr>
-          <p:cNvPr id="258" name="Google Shape;258;p33"/>
-          <p:cNvGrpSpPr/>
-          <p:nvPr/>
-        </p:nvGrpSpPr>
-        <p:grpSpPr>
-          <a:xfrm>
-            <a:off x="4167750" y="4704850"/>
-            <a:ext cx="808500" cy="92100"/>
-            <a:chOff x="3570750" y="4704850"/>
-            <a:chExt cx="808500" cy="92100"/>
-          </a:xfrm>
-        </p:grpSpPr>
-        <p:sp>
-          <p:nvSpPr>
-            <p:cNvPr id="259" name="Google Shape;259;p33"/>
-            <p:cNvSpPr/>
-            <p:nvPr/>
-          </p:nvSpPr>
-          <p:spPr>
-            <a:xfrm>
-              <a:off x="3570750" y="4704850"/>
-              <a:ext cx="92100" cy="92100"/>
-            </a:xfrm>
-            <a:prstGeom prst="ellipse">
-              <a:avLst/>
-            </a:prstGeom>
-            <a:solidFill>
-              <a:schemeClr val="accent6">
-                <a:lumMod val="50000"/>
-              </a:schemeClr>
-            </a:solidFill>
-            <a:ln>
-              <a:noFill/>
-            </a:ln>
-          </p:spPr>
-          <p:txBody>
-            <a:bodyPr spcFirstLastPara="1" wrap="square" lIns="91425" tIns="91425" rIns="91425" bIns="91425" anchor="ctr" anchorCtr="0">
-              <a:noAutofit/>
-            </a:bodyPr>
-            <a:lstStyle/>
-            <a:p>
-              <a:pPr marL="0" lvl="0" indent="0" algn="l" rtl="0">
-                <a:spcBef>
-                  <a:spcPts val="0"/>
-                </a:spcBef>
-                <a:spcAft>
-                  <a:spcPts val="0"/>
-                </a:spcAft>
-                <a:buNone/>
-              </a:pPr>
-              <a:endParaRPr/>
-            </a:p>
-          </p:txBody>
-        </p:sp>
-        <p:sp>
-          <p:nvSpPr>
-            <p:cNvPr id="260" name="Google Shape;260;p33"/>
-            <p:cNvSpPr/>
-            <p:nvPr/>
-          </p:nvSpPr>
-          <p:spPr>
-            <a:xfrm>
-              <a:off x="3809550" y="4704850"/>
-              <a:ext cx="92100" cy="92100"/>
-            </a:xfrm>
-            <a:prstGeom prst="ellipse">
-              <a:avLst/>
-            </a:prstGeom>
-            <a:solidFill>
-              <a:schemeClr val="lt1">
-                <a:alpha val="50000"/>
-              </a:schemeClr>
-            </a:solidFill>
-            <a:ln>
-              <a:noFill/>
-            </a:ln>
-          </p:spPr>
-          <p:txBody>
-            <a:bodyPr spcFirstLastPara="1" wrap="square" lIns="91425" tIns="91425" rIns="91425" bIns="91425" anchor="ctr" anchorCtr="0">
-              <a:noAutofit/>
-            </a:bodyPr>
-            <a:lstStyle/>
-            <a:p>
-              <a:pPr marL="0" lvl="0" indent="0" algn="l" rtl="0">
-                <a:spcBef>
-                  <a:spcPts val="0"/>
-                </a:spcBef>
-                <a:spcAft>
-                  <a:spcPts val="0"/>
-                </a:spcAft>
-                <a:buNone/>
-              </a:pPr>
-              <a:endParaRPr/>
-            </a:p>
-          </p:txBody>
-        </p:sp>
-        <p:sp>
-          <p:nvSpPr>
-            <p:cNvPr id="261" name="Google Shape;261;p33"/>
-            <p:cNvSpPr/>
-            <p:nvPr/>
-          </p:nvSpPr>
-          <p:spPr>
-            <a:xfrm>
-              <a:off x="4048350" y="4704850"/>
-              <a:ext cx="92100" cy="92100"/>
-            </a:xfrm>
-            <a:prstGeom prst="ellipse">
-              <a:avLst/>
-            </a:prstGeom>
-            <a:solidFill>
-              <a:schemeClr val="lt1">
-                <a:alpha val="50000"/>
-              </a:schemeClr>
-            </a:solidFill>
-            <a:ln>
-              <a:noFill/>
-            </a:ln>
-          </p:spPr>
-          <p:txBody>
-            <a:bodyPr spcFirstLastPara="1" wrap="square" lIns="91425" tIns="91425" rIns="91425" bIns="91425" anchor="ctr" anchorCtr="0">
-              <a:noAutofit/>
-            </a:bodyPr>
-            <a:lstStyle/>
-            <a:p>
-              <a:pPr marL="0" lvl="0" indent="0" algn="l" rtl="0">
-                <a:spcBef>
-                  <a:spcPts val="0"/>
-                </a:spcBef>
-                <a:spcAft>
-                  <a:spcPts val="0"/>
-                </a:spcAft>
-                <a:buNone/>
-              </a:pPr>
-              <a:endParaRPr/>
-            </a:p>
-          </p:txBody>
-        </p:sp>
-        <p:sp>
-          <p:nvSpPr>
-            <p:cNvPr id="262" name="Google Shape;262;p33"/>
-            <p:cNvSpPr/>
-            <p:nvPr/>
-          </p:nvSpPr>
-          <p:spPr>
-            <a:xfrm>
-              <a:off x="4287150" y="4704850"/>
-              <a:ext cx="92100" cy="92100"/>
-            </a:xfrm>
-            <a:prstGeom prst="ellipse">
-              <a:avLst/>
-            </a:prstGeom>
-            <a:solidFill>
-              <a:schemeClr val="lt1">
-                <a:alpha val="50000"/>
-              </a:schemeClr>
-            </a:solidFill>
-            <a:ln>
-              <a:noFill/>
-            </a:ln>
-          </p:spPr>
-          <p:txBody>
-            <a:bodyPr spcFirstLastPara="1" wrap="square" lIns="91425" tIns="91425" rIns="91425" bIns="91425" anchor="ctr" anchorCtr="0">
-              <a:noAutofit/>
-            </a:bodyPr>
-            <a:lstStyle/>
-            <a:p>
-              <a:pPr marL="0" lvl="0" indent="0" algn="l" rtl="0">
-                <a:spcBef>
-                  <a:spcPts val="0"/>
-                </a:spcBef>
-                <a:spcAft>
-                  <a:spcPts val="0"/>
-                </a:spcAft>
-                <a:buNone/>
-              </a:pPr>
-              <a:endParaRPr/>
-            </a:p>
-          </p:txBody>
-        </p:sp>
-      </p:grpSp>
       <p:cxnSp>
         <p:nvCxnSpPr>
           <p:cNvPr id="263" name="Google Shape;263;p33"/>
@@ -15281,240 +14307,6 @@
           </a:p>
         </p:txBody>
       </p:sp>
-      <p:sp>
-        <p:nvSpPr>
-          <p:cNvPr id="270" name="Google Shape;270;p34"/>
-          <p:cNvSpPr txBox="1">
-            <a:spLocks noGrp="1"/>
-          </p:cNvSpPr>
-          <p:nvPr>
-            <p:ph type="subTitle" idx="1"/>
-          </p:nvPr>
-        </p:nvSpPr>
-        <p:spPr>
-          <a:xfrm>
-            <a:off x="719999" y="540000"/>
-            <a:ext cx="2675331" cy="323100"/>
-          </a:xfrm>
-          <a:prstGeom prst="rect">
-            <a:avLst/>
-          </a:prstGeom>
-        </p:spPr>
-        <p:txBody>
-          <a:bodyPr spcFirstLastPara="1" wrap="square" lIns="91425" tIns="91425" rIns="91425" bIns="91425" anchor="t" anchorCtr="0">
-            <a:noAutofit/>
-          </a:bodyPr>
-          <a:lstStyle/>
-          <a:p>
-            <a:pPr marL="0" lvl="0" indent="0" algn="l" rtl="0">
-              <a:spcBef>
-                <a:spcPts val="0"/>
-              </a:spcBef>
-              <a:spcAft>
-                <a:spcPts val="0"/>
-              </a:spcAft>
-              <a:buNone/>
-            </a:pPr>
-            <a:r>
-              <a:rPr lang="en" sz="800" dirty="0">
-                <a:latin typeface="Montserrat"/>
-                <a:ea typeface="Montserrat"/>
-                <a:cs typeface="Montserrat"/>
-                <a:sym typeface="Montserrat"/>
-              </a:rPr>
-              <a:t>Cécile Guillot – Ingénieure Machine Learning</a:t>
-            </a:r>
-            <a:endParaRPr sz="800" dirty="0">
-              <a:latin typeface="Montserrat"/>
-              <a:ea typeface="Montserrat"/>
-              <a:cs typeface="Montserrat"/>
-              <a:sym typeface="Montserrat"/>
-            </a:endParaRPr>
-          </a:p>
-        </p:txBody>
-      </p:sp>
-      <p:grpSp>
-        <p:nvGrpSpPr>
-          <p:cNvPr id="271" name="Google Shape;271;p34"/>
-          <p:cNvGrpSpPr/>
-          <p:nvPr/>
-        </p:nvGrpSpPr>
-        <p:grpSpPr>
-          <a:xfrm>
-            <a:off x="4167750" y="4704850"/>
-            <a:ext cx="808500" cy="92100"/>
-            <a:chOff x="3570750" y="4704850"/>
-            <a:chExt cx="808500" cy="92100"/>
-          </a:xfrm>
-        </p:grpSpPr>
-        <p:sp>
-          <p:nvSpPr>
-            <p:cNvPr id="272" name="Google Shape;272;p34"/>
-            <p:cNvSpPr/>
-            <p:nvPr/>
-          </p:nvSpPr>
-          <p:spPr>
-            <a:xfrm>
-              <a:off x="3570750" y="4704850"/>
-              <a:ext cx="92100" cy="92100"/>
-            </a:xfrm>
-            <a:prstGeom prst="ellipse">
-              <a:avLst/>
-            </a:prstGeom>
-            <a:solidFill>
-              <a:schemeClr val="lt1"/>
-            </a:solidFill>
-            <a:ln>
-              <a:noFill/>
-            </a:ln>
-          </p:spPr>
-          <p:txBody>
-            <a:bodyPr spcFirstLastPara="1" wrap="square" lIns="91425" tIns="91425" rIns="91425" bIns="91425" anchor="ctr" anchorCtr="0">
-              <a:noAutofit/>
-            </a:bodyPr>
-            <a:lstStyle/>
-            <a:p>
-              <a:pPr marL="0" lvl="0" indent="0" algn="l" rtl="0">
-                <a:spcBef>
-                  <a:spcPts val="0"/>
-                </a:spcBef>
-                <a:spcAft>
-                  <a:spcPts val="0"/>
-                </a:spcAft>
-                <a:buNone/>
-              </a:pPr>
-              <a:endParaRPr/>
-            </a:p>
-          </p:txBody>
-        </p:sp>
-        <p:sp>
-          <p:nvSpPr>
-            <p:cNvPr id="273" name="Google Shape;273;p34"/>
-            <p:cNvSpPr/>
-            <p:nvPr/>
-          </p:nvSpPr>
-          <p:spPr>
-            <a:xfrm>
-              <a:off x="3809550" y="4704850"/>
-              <a:ext cx="92100" cy="92100"/>
-            </a:xfrm>
-            <a:prstGeom prst="ellipse">
-              <a:avLst/>
-            </a:prstGeom>
-            <a:solidFill>
-              <a:schemeClr val="accent6">
-                <a:lumMod val="50000"/>
-                <a:alpha val="50000"/>
-              </a:schemeClr>
-            </a:solidFill>
-            <a:ln>
-              <a:noFill/>
-            </a:ln>
-          </p:spPr>
-          <p:txBody>
-            <a:bodyPr spcFirstLastPara="1" wrap="square" lIns="91425" tIns="91425" rIns="91425" bIns="91425" anchor="ctr" anchorCtr="0">
-              <a:noAutofit/>
-            </a:bodyPr>
-            <a:lstStyle/>
-            <a:p>
-              <a:pPr marL="0" lvl="0" indent="0" algn="l" rtl="0">
-                <a:spcBef>
-                  <a:spcPts val="0"/>
-                </a:spcBef>
-                <a:spcAft>
-                  <a:spcPts val="0"/>
-                </a:spcAft>
-                <a:buNone/>
-              </a:pPr>
-              <a:endParaRPr/>
-            </a:p>
-          </p:txBody>
-        </p:sp>
-        <p:sp>
-          <p:nvSpPr>
-            <p:cNvPr id="274" name="Google Shape;274;p34"/>
-            <p:cNvSpPr/>
-            <p:nvPr/>
-          </p:nvSpPr>
-          <p:spPr>
-            <a:xfrm>
-              <a:off x="4048350" y="4704850"/>
-              <a:ext cx="92100" cy="92100"/>
-            </a:xfrm>
-            <a:prstGeom prst="ellipse">
-              <a:avLst/>
-            </a:prstGeom>
-            <a:solidFill>
-              <a:schemeClr val="lt1">
-                <a:alpha val="50000"/>
-              </a:schemeClr>
-            </a:solidFill>
-            <a:ln>
-              <a:noFill/>
-            </a:ln>
-          </p:spPr>
-          <p:txBody>
-            <a:bodyPr spcFirstLastPara="1" wrap="square" lIns="91425" tIns="91425" rIns="91425" bIns="91425" anchor="ctr" anchorCtr="0">
-              <a:noAutofit/>
-            </a:bodyPr>
-            <a:lstStyle/>
-            <a:p>
-              <a:pPr marL="0" lvl="0" indent="0" algn="l" rtl="0">
-                <a:spcBef>
-                  <a:spcPts val="0"/>
-                </a:spcBef>
-                <a:spcAft>
-                  <a:spcPts val="0"/>
-                </a:spcAft>
-                <a:buNone/>
-              </a:pPr>
-              <a:endParaRPr/>
-            </a:p>
-          </p:txBody>
-        </p:sp>
-        <p:sp>
-          <p:nvSpPr>
-            <p:cNvPr id="275" name="Google Shape;275;p34"/>
-            <p:cNvSpPr/>
-            <p:nvPr/>
-          </p:nvSpPr>
-          <p:spPr>
-            <a:xfrm>
-              <a:off x="4287150" y="4704850"/>
-              <a:ext cx="92100" cy="92100"/>
-            </a:xfrm>
-            <a:prstGeom prst="ellipse">
-              <a:avLst/>
-            </a:prstGeom>
-            <a:solidFill>
-              <a:schemeClr val="lt1">
-                <a:alpha val="50000"/>
-              </a:schemeClr>
-            </a:solidFill>
-            <a:ln>
-              <a:noFill/>
-            </a:ln>
-          </p:spPr>
-          <p:txBody>
-            <a:bodyPr spcFirstLastPara="1" wrap="square" lIns="91425" tIns="91425" rIns="91425" bIns="91425" anchor="ctr" anchorCtr="0">
-              <a:noAutofit/>
-            </a:bodyPr>
-            <a:lstStyle/>
-            <a:p>
-              <a:pPr marL="0" lvl="0" indent="0" algn="l" rtl="0">
-                <a:spcBef>
-                  <a:spcPts val="0"/>
-                </a:spcBef>
-                <a:spcAft>
-                  <a:spcPts val="0"/>
-                </a:spcAft>
-                <a:buNone/>
-              </a:pPr>
-              <a:endParaRPr/>
-            </a:p>
-          </p:txBody>
-        </p:sp>
-      </p:grpSp>
       <p:cxnSp>
         <p:nvCxnSpPr>
           <p:cNvPr id="276" name="Google Shape;276;p34"/>
@@ -15541,6 +14333,31 @@
           </a:ln>
         </p:spPr>
       </p:cxnSp>
+      <p:sp>
+        <p:nvSpPr>
+          <p:cNvPr id="3" name="Sous-titre 2">
+            <a:extLst>
+              <a:ext uri="{FF2B5EF4-FFF2-40B4-BE49-F238E27FC236}">
+                <a16:creationId xmlns:a16="http://schemas.microsoft.com/office/drawing/2014/main" id="{64DF891D-A8AD-4DA7-ACFC-0F8CF15091ED}"/>
+              </a:ext>
+            </a:extLst>
+          </p:cNvPr>
+          <p:cNvSpPr>
+            <a:spLocks noGrp="1"/>
+          </p:cNvSpPr>
+          <p:nvPr>
+            <p:ph type="subTitle" idx="1"/>
+          </p:nvPr>
+        </p:nvSpPr>
+        <p:spPr/>
+        <p:txBody>
+          <a:bodyPr/>
+          <a:lstStyle/>
+          <a:p>
+            <a:endParaRPr lang="fr-FR" dirty="0"/>
+          </a:p>
+        </p:txBody>
+      </p:sp>
     </p:spTree>
   </p:cSld>
   <p:clrMapOvr>
@@ -15650,301 +14467,6 @@
             <a:r>
               <a:rPr lang="fr-FR" dirty="0"/>
               <a:t>(Notebook « Notebook Analyse »)</a:t>
-            </a:r>
-          </a:p>
-        </p:txBody>
-      </p:sp>
-      <p:sp>
-        <p:nvSpPr>
-          <p:cNvPr id="4" name="Google Shape;270;p34">
-            <a:extLst>
-              <a:ext uri="{FF2B5EF4-FFF2-40B4-BE49-F238E27FC236}">
-                <a16:creationId xmlns:a16="http://schemas.microsoft.com/office/drawing/2014/main" id="{94887296-E945-4352-9CEB-BB298C13FA80}"/>
-              </a:ext>
-            </a:extLst>
-          </p:cNvPr>
-          <p:cNvSpPr txBox="1">
-            <a:spLocks/>
-          </p:cNvSpPr>
-          <p:nvPr/>
-        </p:nvSpPr>
-        <p:spPr>
-          <a:xfrm>
-            <a:off x="719999" y="540000"/>
-            <a:ext cx="2675331" cy="323100"/>
-          </a:xfrm>
-          <a:prstGeom prst="rect">
-            <a:avLst/>
-          </a:prstGeom>
-          <a:noFill/>
-          <a:ln>
-            <a:noFill/>
-          </a:ln>
-        </p:spPr>
-        <p:txBody>
-          <a:bodyPr spcFirstLastPara="1" wrap="square" lIns="91425" tIns="91425" rIns="91425" bIns="91425" anchor="t" anchorCtr="0">
-            <a:noAutofit/>
-          </a:bodyPr>
-          <a:lstStyle>
-            <a:defPPr marR="0" lvl="0" algn="l" rtl="0">
-              <a:lnSpc>
-                <a:spcPct val="100000"/>
-              </a:lnSpc>
-              <a:spcBef>
-                <a:spcPts val="0"/>
-              </a:spcBef>
-              <a:spcAft>
-                <a:spcPts val="0"/>
-              </a:spcAft>
-            </a:defPPr>
-            <a:lvl1pPr marL="457200" marR="0" lvl="0" indent="-342900" algn="l" rtl="0">
-              <a:lnSpc>
-                <a:spcPct val="100000"/>
-              </a:lnSpc>
-              <a:spcBef>
-                <a:spcPts val="0"/>
-              </a:spcBef>
-              <a:spcAft>
-                <a:spcPts val="0"/>
-              </a:spcAft>
-              <a:buClr>
-                <a:schemeClr val="lt1"/>
-              </a:buClr>
-              <a:buSzPts val="800"/>
-              <a:buFont typeface="Open Sans"/>
-              <a:buChar char="●"/>
-              <a:defRPr sz="1400" b="0" i="0" u="none" strike="noStrike" cap="none">
-                <a:solidFill>
-                  <a:schemeClr val="lt1"/>
-                </a:solidFill>
-                <a:latin typeface="Muli"/>
-                <a:ea typeface="Muli"/>
-                <a:cs typeface="Muli"/>
-                <a:sym typeface="Muli"/>
-              </a:defRPr>
-            </a:lvl1pPr>
-            <a:lvl2pPr marL="914400" marR="0" lvl="1" indent="-317500" algn="ctr" rtl="0">
-              <a:lnSpc>
-                <a:spcPct val="100000"/>
-              </a:lnSpc>
-              <a:spcBef>
-                <a:spcPts val="0"/>
-              </a:spcBef>
-              <a:spcAft>
-                <a:spcPts val="0"/>
-              </a:spcAft>
-              <a:buClr>
-                <a:schemeClr val="lt1"/>
-              </a:buClr>
-              <a:buSzPts val="800"/>
-              <a:buFont typeface="Open Sans"/>
-              <a:buChar char="○"/>
-              <a:defRPr sz="2100" b="0" i="0" u="none" strike="noStrike" cap="none">
-                <a:solidFill>
-                  <a:schemeClr val="lt1"/>
-                </a:solidFill>
-                <a:latin typeface="Muli"/>
-                <a:ea typeface="Muli"/>
-                <a:cs typeface="Muli"/>
-                <a:sym typeface="Muli"/>
-              </a:defRPr>
-            </a:lvl2pPr>
-            <a:lvl3pPr marL="1371600" marR="0" lvl="2" indent="-317500" algn="ctr" rtl="0">
-              <a:lnSpc>
-                <a:spcPct val="100000"/>
-              </a:lnSpc>
-              <a:spcBef>
-                <a:spcPts val="0"/>
-              </a:spcBef>
-              <a:spcAft>
-                <a:spcPts val="0"/>
-              </a:spcAft>
-              <a:buClr>
-                <a:schemeClr val="lt1"/>
-              </a:buClr>
-              <a:buSzPts val="800"/>
-              <a:buFont typeface="Open Sans"/>
-              <a:buChar char="■"/>
-              <a:defRPr sz="2100" b="0" i="0" u="none" strike="noStrike" cap="none">
-                <a:solidFill>
-                  <a:schemeClr val="lt1"/>
-                </a:solidFill>
-                <a:latin typeface="Muli"/>
-                <a:ea typeface="Muli"/>
-                <a:cs typeface="Muli"/>
-                <a:sym typeface="Muli"/>
-              </a:defRPr>
-            </a:lvl3pPr>
-            <a:lvl4pPr marL="1828800" marR="0" lvl="3" indent="-317500" algn="ctr" rtl="0">
-              <a:lnSpc>
-                <a:spcPct val="100000"/>
-              </a:lnSpc>
-              <a:spcBef>
-                <a:spcPts val="0"/>
-              </a:spcBef>
-              <a:spcAft>
-                <a:spcPts val="0"/>
-              </a:spcAft>
-              <a:buClr>
-                <a:schemeClr val="lt1"/>
-              </a:buClr>
-              <a:buSzPts val="800"/>
-              <a:buFont typeface="Open Sans"/>
-              <a:buChar char="●"/>
-              <a:defRPr sz="2100" b="0" i="0" u="none" strike="noStrike" cap="none">
-                <a:solidFill>
-                  <a:schemeClr val="lt1"/>
-                </a:solidFill>
-                <a:latin typeface="Muli"/>
-                <a:ea typeface="Muli"/>
-                <a:cs typeface="Muli"/>
-                <a:sym typeface="Muli"/>
-              </a:defRPr>
-            </a:lvl4pPr>
-            <a:lvl5pPr marL="2286000" marR="0" lvl="4" indent="-317500" algn="ctr" rtl="0">
-              <a:lnSpc>
-                <a:spcPct val="100000"/>
-              </a:lnSpc>
-              <a:spcBef>
-                <a:spcPts val="0"/>
-              </a:spcBef>
-              <a:spcAft>
-                <a:spcPts val="0"/>
-              </a:spcAft>
-              <a:buClr>
-                <a:schemeClr val="lt1"/>
-              </a:buClr>
-              <a:buSzPts val="1100"/>
-              <a:buFont typeface="Open Sans"/>
-              <a:buChar char="○"/>
-              <a:defRPr sz="2100" b="0" i="0" u="none" strike="noStrike" cap="none">
-                <a:solidFill>
-                  <a:schemeClr val="lt1"/>
-                </a:solidFill>
-                <a:latin typeface="Muli"/>
-                <a:ea typeface="Muli"/>
-                <a:cs typeface="Muli"/>
-                <a:sym typeface="Muli"/>
-              </a:defRPr>
-            </a:lvl5pPr>
-            <a:lvl6pPr marL="2743200" marR="0" lvl="5" indent="-317500" algn="ctr" rtl="0">
-              <a:lnSpc>
-                <a:spcPct val="100000"/>
-              </a:lnSpc>
-              <a:spcBef>
-                <a:spcPts val="0"/>
-              </a:spcBef>
-              <a:spcAft>
-                <a:spcPts val="0"/>
-              </a:spcAft>
-              <a:buClr>
-                <a:schemeClr val="lt1"/>
-              </a:buClr>
-              <a:buSzPts val="1100"/>
-              <a:buFont typeface="Open Sans"/>
-              <a:buChar char="■"/>
-              <a:defRPr sz="2100" b="0" i="0" u="none" strike="noStrike" cap="none">
-                <a:solidFill>
-                  <a:schemeClr val="lt1"/>
-                </a:solidFill>
-                <a:latin typeface="Muli"/>
-                <a:ea typeface="Muli"/>
-                <a:cs typeface="Muli"/>
-                <a:sym typeface="Muli"/>
-              </a:defRPr>
-            </a:lvl6pPr>
-            <a:lvl7pPr marL="3200400" marR="0" lvl="6" indent="-317500" algn="ctr" rtl="0">
-              <a:lnSpc>
-                <a:spcPct val="100000"/>
-              </a:lnSpc>
-              <a:spcBef>
-                <a:spcPts val="0"/>
-              </a:spcBef>
-              <a:spcAft>
-                <a:spcPts val="0"/>
-              </a:spcAft>
-              <a:buClr>
-                <a:schemeClr val="lt1"/>
-              </a:buClr>
-              <a:buSzPts val="700"/>
-              <a:buFont typeface="Open Sans"/>
-              <a:buChar char="●"/>
-              <a:defRPr sz="2100" b="0" i="0" u="none" strike="noStrike" cap="none">
-                <a:solidFill>
-                  <a:schemeClr val="lt1"/>
-                </a:solidFill>
-                <a:latin typeface="Muli"/>
-                <a:ea typeface="Muli"/>
-                <a:cs typeface="Muli"/>
-                <a:sym typeface="Muli"/>
-              </a:defRPr>
-            </a:lvl7pPr>
-            <a:lvl8pPr marL="3657600" marR="0" lvl="7" indent="-317500" algn="ctr" rtl="0">
-              <a:lnSpc>
-                <a:spcPct val="100000"/>
-              </a:lnSpc>
-              <a:spcBef>
-                <a:spcPts val="0"/>
-              </a:spcBef>
-              <a:spcAft>
-                <a:spcPts val="0"/>
-              </a:spcAft>
-              <a:buClr>
-                <a:schemeClr val="lt1"/>
-              </a:buClr>
-              <a:buSzPts val="700"/>
-              <a:buFont typeface="Open Sans"/>
-              <a:buChar char="○"/>
-              <a:defRPr sz="2100" b="0" i="0" u="none" strike="noStrike" cap="none">
-                <a:solidFill>
-                  <a:schemeClr val="lt1"/>
-                </a:solidFill>
-                <a:latin typeface="Muli"/>
-                <a:ea typeface="Muli"/>
-                <a:cs typeface="Muli"/>
-                <a:sym typeface="Muli"/>
-              </a:defRPr>
-            </a:lvl8pPr>
-            <a:lvl9pPr marL="4114800" marR="0" lvl="8" indent="-317500" algn="ctr" rtl="0">
-              <a:lnSpc>
-                <a:spcPct val="100000"/>
-              </a:lnSpc>
-              <a:spcBef>
-                <a:spcPts val="0"/>
-              </a:spcBef>
-              <a:spcAft>
-                <a:spcPts val="0"/>
-              </a:spcAft>
-              <a:buClr>
-                <a:schemeClr val="lt1"/>
-              </a:buClr>
-              <a:buSzPts val="600"/>
-              <a:buFont typeface="Open Sans"/>
-              <a:buChar char="■"/>
-              <a:defRPr sz="2100" b="0" i="0" u="none" strike="noStrike" cap="none">
-                <a:solidFill>
-                  <a:schemeClr val="lt1"/>
-                </a:solidFill>
-                <a:latin typeface="Muli"/>
-                <a:ea typeface="Muli"/>
-                <a:cs typeface="Muli"/>
-                <a:sym typeface="Muli"/>
-              </a:defRPr>
-            </a:lvl9pPr>
-          </a:lstStyle>
-          <a:p>
-            <a:pPr marL="0" indent="0">
-              <a:buFont typeface="Open Sans"/>
-              <a:buNone/>
-            </a:pPr>
-            <a:r>
-              <a:rPr lang="fr-FR" sz="800" dirty="0">
-                <a:latin typeface="Montserrat"/>
-                <a:ea typeface="Montserrat"/>
-                <a:cs typeface="Montserrat"/>
-                <a:sym typeface="Montserrat"/>
-              </a:rPr>
-              <a:t>Cécile Guillot – Ingénieure Machine Learning</a:t>
             </a:r>
           </a:p>
         </p:txBody>
@@ -16084,514 +14606,6 @@
           </a:p>
         </p:txBody>
       </p:sp>
-      <p:sp>
-        <p:nvSpPr>
-          <p:cNvPr id="6" name="Google Shape;270;p34">
-            <a:extLst>
-              <a:ext uri="{FF2B5EF4-FFF2-40B4-BE49-F238E27FC236}">
-                <a16:creationId xmlns:a16="http://schemas.microsoft.com/office/drawing/2014/main" id="{09C0CD01-4532-42F1-8527-7F5F330577BE}"/>
-              </a:ext>
-            </a:extLst>
-          </p:cNvPr>
-          <p:cNvSpPr txBox="1">
-            <a:spLocks/>
-          </p:cNvSpPr>
-          <p:nvPr/>
-        </p:nvSpPr>
-        <p:spPr>
-          <a:xfrm>
-            <a:off x="478995" y="473239"/>
-            <a:ext cx="2675331" cy="323100"/>
-          </a:xfrm>
-          <a:prstGeom prst="rect">
-            <a:avLst/>
-          </a:prstGeom>
-          <a:noFill/>
-          <a:ln>
-            <a:noFill/>
-          </a:ln>
-        </p:spPr>
-        <p:txBody>
-          <a:bodyPr spcFirstLastPara="1" wrap="square" lIns="91425" tIns="91425" rIns="91425" bIns="91425" anchor="t" anchorCtr="0">
-            <a:noAutofit/>
-          </a:bodyPr>
-          <a:lstStyle>
-            <a:defPPr marR="0" lvl="0" algn="l" rtl="0">
-              <a:lnSpc>
-                <a:spcPct val="100000"/>
-              </a:lnSpc>
-              <a:spcBef>
-                <a:spcPts val="0"/>
-              </a:spcBef>
-              <a:spcAft>
-                <a:spcPts val="0"/>
-              </a:spcAft>
-            </a:defPPr>
-            <a:lvl1pPr marL="457200" marR="0" lvl="0" indent="-342900" algn="l" rtl="0">
-              <a:lnSpc>
-                <a:spcPct val="100000"/>
-              </a:lnSpc>
-              <a:spcBef>
-                <a:spcPts val="0"/>
-              </a:spcBef>
-              <a:spcAft>
-                <a:spcPts val="0"/>
-              </a:spcAft>
-              <a:buClr>
-                <a:schemeClr val="lt1"/>
-              </a:buClr>
-              <a:buSzPts val="800"/>
-              <a:buFont typeface="Open Sans"/>
-              <a:buChar char="●"/>
-              <a:defRPr sz="1400" b="0" i="0" u="none" strike="noStrike" cap="none">
-                <a:solidFill>
-                  <a:schemeClr val="lt1"/>
-                </a:solidFill>
-                <a:latin typeface="Muli"/>
-                <a:ea typeface="Muli"/>
-                <a:cs typeface="Muli"/>
-                <a:sym typeface="Muli"/>
-              </a:defRPr>
-            </a:lvl1pPr>
-            <a:lvl2pPr marL="914400" marR="0" lvl="1" indent="-317500" algn="ctr" rtl="0">
-              <a:lnSpc>
-                <a:spcPct val="100000"/>
-              </a:lnSpc>
-              <a:spcBef>
-                <a:spcPts val="0"/>
-              </a:spcBef>
-              <a:spcAft>
-                <a:spcPts val="0"/>
-              </a:spcAft>
-              <a:buClr>
-                <a:schemeClr val="lt1"/>
-              </a:buClr>
-              <a:buSzPts val="800"/>
-              <a:buFont typeface="Open Sans"/>
-              <a:buChar char="○"/>
-              <a:defRPr sz="2100" b="0" i="0" u="none" strike="noStrike" cap="none">
-                <a:solidFill>
-                  <a:schemeClr val="lt1"/>
-                </a:solidFill>
-                <a:latin typeface="Muli"/>
-                <a:ea typeface="Muli"/>
-                <a:cs typeface="Muli"/>
-                <a:sym typeface="Muli"/>
-              </a:defRPr>
-            </a:lvl2pPr>
-            <a:lvl3pPr marL="1371600" marR="0" lvl="2" indent="-317500" algn="ctr" rtl="0">
-              <a:lnSpc>
-                <a:spcPct val="100000"/>
-              </a:lnSpc>
-              <a:spcBef>
-                <a:spcPts val="0"/>
-              </a:spcBef>
-              <a:spcAft>
-                <a:spcPts val="0"/>
-              </a:spcAft>
-              <a:buClr>
-                <a:schemeClr val="lt1"/>
-              </a:buClr>
-              <a:buSzPts val="800"/>
-              <a:buFont typeface="Open Sans"/>
-              <a:buChar char="■"/>
-              <a:defRPr sz="2100" b="0" i="0" u="none" strike="noStrike" cap="none">
-                <a:solidFill>
-                  <a:schemeClr val="lt1"/>
-                </a:solidFill>
-                <a:latin typeface="Muli"/>
-                <a:ea typeface="Muli"/>
-                <a:cs typeface="Muli"/>
-                <a:sym typeface="Muli"/>
-              </a:defRPr>
-            </a:lvl3pPr>
-            <a:lvl4pPr marL="1828800" marR="0" lvl="3" indent="-317500" algn="ctr" rtl="0">
-              <a:lnSpc>
-                <a:spcPct val="100000"/>
-              </a:lnSpc>
-              <a:spcBef>
-                <a:spcPts val="0"/>
-              </a:spcBef>
-              <a:spcAft>
-                <a:spcPts val="0"/>
-              </a:spcAft>
-              <a:buClr>
-                <a:schemeClr val="lt1"/>
-              </a:buClr>
-              <a:buSzPts val="800"/>
-              <a:buFont typeface="Open Sans"/>
-              <a:buChar char="●"/>
-              <a:defRPr sz="2100" b="0" i="0" u="none" strike="noStrike" cap="none">
-                <a:solidFill>
-                  <a:schemeClr val="lt1"/>
-                </a:solidFill>
-                <a:latin typeface="Muli"/>
-                <a:ea typeface="Muli"/>
-                <a:cs typeface="Muli"/>
-                <a:sym typeface="Muli"/>
-              </a:defRPr>
-            </a:lvl4pPr>
-            <a:lvl5pPr marL="2286000" marR="0" lvl="4" indent="-317500" algn="ctr" rtl="0">
-              <a:lnSpc>
-                <a:spcPct val="100000"/>
-              </a:lnSpc>
-              <a:spcBef>
-                <a:spcPts val="0"/>
-              </a:spcBef>
-              <a:spcAft>
-                <a:spcPts val="0"/>
-              </a:spcAft>
-              <a:buClr>
-                <a:schemeClr val="lt1"/>
-              </a:buClr>
-              <a:buSzPts val="1100"/>
-              <a:buFont typeface="Open Sans"/>
-              <a:buChar char="○"/>
-              <a:defRPr sz="2100" b="0" i="0" u="none" strike="noStrike" cap="none">
-                <a:solidFill>
-                  <a:schemeClr val="lt1"/>
-                </a:solidFill>
-                <a:latin typeface="Muli"/>
-                <a:ea typeface="Muli"/>
-                <a:cs typeface="Muli"/>
-                <a:sym typeface="Muli"/>
-              </a:defRPr>
-            </a:lvl5pPr>
-            <a:lvl6pPr marL="2743200" marR="0" lvl="5" indent="-317500" algn="ctr" rtl="0">
-              <a:lnSpc>
-                <a:spcPct val="100000"/>
-              </a:lnSpc>
-              <a:spcBef>
-                <a:spcPts val="0"/>
-              </a:spcBef>
-              <a:spcAft>
-                <a:spcPts val="0"/>
-              </a:spcAft>
-              <a:buClr>
-                <a:schemeClr val="lt1"/>
-              </a:buClr>
-              <a:buSzPts val="1100"/>
-              <a:buFont typeface="Open Sans"/>
-              <a:buChar char="■"/>
-              <a:defRPr sz="2100" b="0" i="0" u="none" strike="noStrike" cap="none">
-                <a:solidFill>
-                  <a:schemeClr val="lt1"/>
-                </a:solidFill>
-                <a:latin typeface="Muli"/>
-                <a:ea typeface="Muli"/>
-                <a:cs typeface="Muli"/>
-                <a:sym typeface="Muli"/>
-              </a:defRPr>
-            </a:lvl6pPr>
-            <a:lvl7pPr marL="3200400" marR="0" lvl="6" indent="-317500" algn="ctr" rtl="0">
-              <a:lnSpc>
-                <a:spcPct val="100000"/>
-              </a:lnSpc>
-              <a:spcBef>
-                <a:spcPts val="0"/>
-              </a:spcBef>
-              <a:spcAft>
-                <a:spcPts val="0"/>
-              </a:spcAft>
-              <a:buClr>
-                <a:schemeClr val="lt1"/>
-              </a:buClr>
-              <a:buSzPts val="700"/>
-              <a:buFont typeface="Open Sans"/>
-              <a:buChar char="●"/>
-              <a:defRPr sz="2100" b="0" i="0" u="none" strike="noStrike" cap="none">
-                <a:solidFill>
-                  <a:schemeClr val="lt1"/>
-                </a:solidFill>
-                <a:latin typeface="Muli"/>
-                <a:ea typeface="Muli"/>
-                <a:cs typeface="Muli"/>
-                <a:sym typeface="Muli"/>
-              </a:defRPr>
-            </a:lvl7pPr>
-            <a:lvl8pPr marL="3657600" marR="0" lvl="7" indent="-317500" algn="ctr" rtl="0">
-              <a:lnSpc>
-                <a:spcPct val="100000"/>
-              </a:lnSpc>
-              <a:spcBef>
-                <a:spcPts val="0"/>
-              </a:spcBef>
-              <a:spcAft>
-                <a:spcPts val="0"/>
-              </a:spcAft>
-              <a:buClr>
-                <a:schemeClr val="lt1"/>
-              </a:buClr>
-              <a:buSzPts val="700"/>
-              <a:buFont typeface="Open Sans"/>
-              <a:buChar char="○"/>
-              <a:defRPr sz="2100" b="0" i="0" u="none" strike="noStrike" cap="none">
-                <a:solidFill>
-                  <a:schemeClr val="lt1"/>
-                </a:solidFill>
-                <a:latin typeface="Muli"/>
-                <a:ea typeface="Muli"/>
-                <a:cs typeface="Muli"/>
-                <a:sym typeface="Muli"/>
-              </a:defRPr>
-            </a:lvl8pPr>
-            <a:lvl9pPr marL="4114800" marR="0" lvl="8" indent="-317500" algn="ctr" rtl="0">
-              <a:lnSpc>
-                <a:spcPct val="100000"/>
-              </a:lnSpc>
-              <a:spcBef>
-                <a:spcPts val="0"/>
-              </a:spcBef>
-              <a:spcAft>
-                <a:spcPts val="0"/>
-              </a:spcAft>
-              <a:buClr>
-                <a:schemeClr val="lt1"/>
-              </a:buClr>
-              <a:buSzPts val="600"/>
-              <a:buFont typeface="Open Sans"/>
-              <a:buChar char="■"/>
-              <a:defRPr sz="2100" b="0" i="0" u="none" strike="noStrike" cap="none">
-                <a:solidFill>
-                  <a:schemeClr val="lt1"/>
-                </a:solidFill>
-                <a:latin typeface="Muli"/>
-                <a:ea typeface="Muli"/>
-                <a:cs typeface="Muli"/>
-                <a:sym typeface="Muli"/>
-              </a:defRPr>
-            </a:lvl9pPr>
-          </a:lstStyle>
-          <a:p>
-            <a:pPr marL="0" indent="0">
-              <a:buFont typeface="Open Sans"/>
-              <a:buNone/>
-            </a:pPr>
-            <a:r>
-              <a:rPr lang="fr-FR" sz="800" dirty="0">
-                <a:latin typeface="Montserrat"/>
-                <a:ea typeface="Montserrat"/>
-                <a:cs typeface="Montserrat"/>
-                <a:sym typeface="Montserrat"/>
-              </a:rPr>
-              <a:t>Cécile Guillot – Ingénieure Machine Learning</a:t>
-            </a:r>
-          </a:p>
-        </p:txBody>
-      </p:sp>
-      <p:grpSp>
-        <p:nvGrpSpPr>
-          <p:cNvPr id="7" name="Google Shape;258;p33">
-            <a:extLst>
-              <a:ext uri="{FF2B5EF4-FFF2-40B4-BE49-F238E27FC236}">
-                <a16:creationId xmlns:a16="http://schemas.microsoft.com/office/drawing/2014/main" id="{6BB0B783-7FAC-4F35-8A62-B4D8500E91FA}"/>
-              </a:ext>
-            </a:extLst>
-          </p:cNvPr>
-          <p:cNvGrpSpPr/>
-          <p:nvPr/>
-        </p:nvGrpSpPr>
-        <p:grpSpPr>
-          <a:xfrm>
-            <a:off x="4167750" y="4775733"/>
-            <a:ext cx="808500" cy="92100"/>
-            <a:chOff x="3570750" y="4704850"/>
-            <a:chExt cx="808500" cy="92100"/>
-          </a:xfrm>
-        </p:grpSpPr>
-        <p:sp>
-          <p:nvSpPr>
-            <p:cNvPr id="8" name="Google Shape;259;p33">
-              <a:extLst>
-                <a:ext uri="{FF2B5EF4-FFF2-40B4-BE49-F238E27FC236}">
-                  <a16:creationId xmlns:a16="http://schemas.microsoft.com/office/drawing/2014/main" id="{275F6470-9CFD-4808-9154-9AC9BB17A5F2}"/>
-                </a:ext>
-              </a:extLst>
-            </p:cNvPr>
-            <p:cNvSpPr/>
-            <p:nvPr/>
-          </p:nvSpPr>
-          <p:spPr>
-            <a:xfrm>
-              <a:off x="3570750" y="4704850"/>
-              <a:ext cx="92100" cy="92100"/>
-            </a:xfrm>
-            <a:prstGeom prst="ellipse">
-              <a:avLst/>
-            </a:prstGeom>
-            <a:solidFill>
-              <a:schemeClr val="accent6">
-                <a:lumMod val="50000"/>
-              </a:schemeClr>
-            </a:solidFill>
-            <a:ln>
-              <a:noFill/>
-            </a:ln>
-          </p:spPr>
-          <p:txBody>
-            <a:bodyPr spcFirstLastPara="1" wrap="square" lIns="91425" tIns="91425" rIns="91425" bIns="91425" anchor="ctr" anchorCtr="0">
-              <a:noAutofit/>
-            </a:bodyPr>
-            <a:lstStyle/>
-            <a:p>
-              <a:pPr marL="0" lvl="0" indent="0" algn="l" rtl="0">
-                <a:spcBef>
-                  <a:spcPts val="0"/>
-                </a:spcBef>
-                <a:spcAft>
-                  <a:spcPts val="0"/>
-                </a:spcAft>
-                <a:buNone/>
-              </a:pPr>
-              <a:endParaRPr/>
-            </a:p>
-          </p:txBody>
-        </p:sp>
-        <p:sp>
-          <p:nvSpPr>
-            <p:cNvPr id="9" name="Google Shape;260;p33">
-              <a:extLst>
-                <a:ext uri="{FF2B5EF4-FFF2-40B4-BE49-F238E27FC236}">
-                  <a16:creationId xmlns:a16="http://schemas.microsoft.com/office/drawing/2014/main" id="{F9AB4B49-3D25-47B7-AC35-4A36BFC1D8BC}"/>
-                </a:ext>
-              </a:extLst>
-            </p:cNvPr>
-            <p:cNvSpPr/>
-            <p:nvPr/>
-          </p:nvSpPr>
-          <p:spPr>
-            <a:xfrm>
-              <a:off x="3809550" y="4704850"/>
-              <a:ext cx="92100" cy="92100"/>
-            </a:xfrm>
-            <a:prstGeom prst="ellipse">
-              <a:avLst/>
-            </a:prstGeom>
-            <a:solidFill>
-              <a:schemeClr val="lt1">
-                <a:alpha val="50000"/>
-              </a:schemeClr>
-            </a:solidFill>
-            <a:ln>
-              <a:noFill/>
-            </a:ln>
-          </p:spPr>
-          <p:txBody>
-            <a:bodyPr spcFirstLastPara="1" wrap="square" lIns="91425" tIns="91425" rIns="91425" bIns="91425" anchor="ctr" anchorCtr="0">
-              <a:noAutofit/>
-            </a:bodyPr>
-            <a:lstStyle/>
-            <a:p>
-              <a:pPr marL="0" lvl="0" indent="0" algn="l" rtl="0">
-                <a:spcBef>
-                  <a:spcPts val="0"/>
-                </a:spcBef>
-                <a:spcAft>
-                  <a:spcPts val="0"/>
-                </a:spcAft>
-                <a:buNone/>
-              </a:pPr>
-              <a:endParaRPr/>
-            </a:p>
-          </p:txBody>
-        </p:sp>
-        <p:sp>
-          <p:nvSpPr>
-            <p:cNvPr id="10" name="Google Shape;261;p33">
-              <a:extLst>
-                <a:ext uri="{FF2B5EF4-FFF2-40B4-BE49-F238E27FC236}">
-                  <a16:creationId xmlns:a16="http://schemas.microsoft.com/office/drawing/2014/main" id="{6FD34A8C-6139-4EED-B860-38926490E6C7}"/>
-                </a:ext>
-              </a:extLst>
-            </p:cNvPr>
-            <p:cNvSpPr/>
-            <p:nvPr/>
-          </p:nvSpPr>
-          <p:spPr>
-            <a:xfrm>
-              <a:off x="4048350" y="4704850"/>
-              <a:ext cx="92100" cy="92100"/>
-            </a:xfrm>
-            <a:prstGeom prst="ellipse">
-              <a:avLst/>
-            </a:prstGeom>
-            <a:solidFill>
-              <a:schemeClr val="lt1">
-                <a:alpha val="50000"/>
-              </a:schemeClr>
-            </a:solidFill>
-            <a:ln>
-              <a:noFill/>
-            </a:ln>
-          </p:spPr>
-          <p:txBody>
-            <a:bodyPr spcFirstLastPara="1" wrap="square" lIns="91425" tIns="91425" rIns="91425" bIns="91425" anchor="ctr" anchorCtr="0">
-              <a:noAutofit/>
-            </a:bodyPr>
-            <a:lstStyle/>
-            <a:p>
-              <a:pPr marL="0" lvl="0" indent="0" algn="l" rtl="0">
-                <a:spcBef>
-                  <a:spcPts val="0"/>
-                </a:spcBef>
-                <a:spcAft>
-                  <a:spcPts val="0"/>
-                </a:spcAft>
-                <a:buNone/>
-              </a:pPr>
-              <a:endParaRPr/>
-            </a:p>
-          </p:txBody>
-        </p:sp>
-        <p:sp>
-          <p:nvSpPr>
-            <p:cNvPr id="11" name="Google Shape;262;p33">
-              <a:extLst>
-                <a:ext uri="{FF2B5EF4-FFF2-40B4-BE49-F238E27FC236}">
-                  <a16:creationId xmlns:a16="http://schemas.microsoft.com/office/drawing/2014/main" id="{01886F20-824F-40A2-9882-4B02F5328051}"/>
-                </a:ext>
-              </a:extLst>
-            </p:cNvPr>
-            <p:cNvSpPr/>
-            <p:nvPr/>
-          </p:nvSpPr>
-          <p:spPr>
-            <a:xfrm>
-              <a:off x="4287150" y="4704850"/>
-              <a:ext cx="92100" cy="92100"/>
-            </a:xfrm>
-            <a:prstGeom prst="ellipse">
-              <a:avLst/>
-            </a:prstGeom>
-            <a:solidFill>
-              <a:schemeClr val="lt1">
-                <a:alpha val="50000"/>
-              </a:schemeClr>
-            </a:solidFill>
-            <a:ln>
-              <a:noFill/>
-            </a:ln>
-          </p:spPr>
-          <p:txBody>
-            <a:bodyPr spcFirstLastPara="1" wrap="square" lIns="91425" tIns="91425" rIns="91425" bIns="91425" anchor="ctr" anchorCtr="0">
-              <a:noAutofit/>
-            </a:bodyPr>
-            <a:lstStyle/>
-            <a:p>
-              <a:pPr marL="0" lvl="0" indent="0" algn="l" rtl="0">
-                <a:spcBef>
-                  <a:spcPts val="0"/>
-                </a:spcBef>
-                <a:spcAft>
-                  <a:spcPts val="0"/>
-                </a:spcAft>
-                <a:buNone/>
-              </a:pPr>
-              <a:endParaRPr/>
-            </a:p>
-          </p:txBody>
-        </p:sp>
-      </p:grpSp>
     </p:spTree>
     <p:extLst>
       <p:ext uri="{BB962C8B-B14F-4D97-AF65-F5344CB8AC3E}">
@@ -16682,224 +14696,6 @@
           </a:p>
         </p:txBody>
       </p:sp>
-      <p:grpSp>
-        <p:nvGrpSpPr>
-          <p:cNvPr id="4" name="Google Shape;258;p33">
-            <a:extLst>
-              <a:ext uri="{FF2B5EF4-FFF2-40B4-BE49-F238E27FC236}">
-                <a16:creationId xmlns:a16="http://schemas.microsoft.com/office/drawing/2014/main" id="{F73525D1-694E-4E82-95AA-3B5A3A932749}"/>
-              </a:ext>
-            </a:extLst>
-          </p:cNvPr>
-          <p:cNvGrpSpPr/>
-          <p:nvPr/>
-        </p:nvGrpSpPr>
-        <p:grpSpPr>
-          <a:xfrm>
-            <a:off x="4167750" y="4704850"/>
-            <a:ext cx="808500" cy="92100"/>
-            <a:chOff x="3570750" y="4704850"/>
-            <a:chExt cx="808500" cy="92100"/>
-          </a:xfrm>
-        </p:grpSpPr>
-        <p:sp>
-          <p:nvSpPr>
-            <p:cNvPr id="5" name="Google Shape;259;p33">
-              <a:extLst>
-                <a:ext uri="{FF2B5EF4-FFF2-40B4-BE49-F238E27FC236}">
-                  <a16:creationId xmlns:a16="http://schemas.microsoft.com/office/drawing/2014/main" id="{C96F8A24-2B8F-480C-AE16-880F91BB3278}"/>
-                </a:ext>
-              </a:extLst>
-            </p:cNvPr>
-            <p:cNvSpPr/>
-            <p:nvPr/>
-          </p:nvSpPr>
-          <p:spPr>
-            <a:xfrm>
-              <a:off x="3570750" y="4704850"/>
-              <a:ext cx="92100" cy="92100"/>
-            </a:xfrm>
-            <a:prstGeom prst="ellipse">
-              <a:avLst/>
-            </a:prstGeom>
-            <a:solidFill>
-              <a:schemeClr val="accent6">
-                <a:lumMod val="50000"/>
-              </a:schemeClr>
-            </a:solidFill>
-            <a:ln>
-              <a:solidFill>
-                <a:schemeClr val="bg1">
-                  <a:lumMod val="95000"/>
-                </a:schemeClr>
-              </a:solidFill>
-            </a:ln>
-          </p:spPr>
-          <p:txBody>
-            <a:bodyPr spcFirstLastPara="1" wrap="square" lIns="91425" tIns="91425" rIns="91425" bIns="91425" anchor="ctr" anchorCtr="0">
-              <a:noAutofit/>
-            </a:bodyPr>
-            <a:lstStyle/>
-            <a:p>
-              <a:pPr marL="0" lvl="0" indent="0" algn="l" rtl="0">
-                <a:spcBef>
-                  <a:spcPts val="0"/>
-                </a:spcBef>
-                <a:spcAft>
-                  <a:spcPts val="0"/>
-                </a:spcAft>
-                <a:buNone/>
-              </a:pPr>
-              <a:endParaRPr/>
-            </a:p>
-          </p:txBody>
-        </p:sp>
-        <p:sp>
-          <p:nvSpPr>
-            <p:cNvPr id="6" name="Google Shape;260;p33">
-              <a:extLst>
-                <a:ext uri="{FF2B5EF4-FFF2-40B4-BE49-F238E27FC236}">
-                  <a16:creationId xmlns:a16="http://schemas.microsoft.com/office/drawing/2014/main" id="{DC5B1191-456F-48FE-8171-F5BDF4D2F5FB}"/>
-                </a:ext>
-              </a:extLst>
-            </p:cNvPr>
-            <p:cNvSpPr/>
-            <p:nvPr/>
-          </p:nvSpPr>
-          <p:spPr>
-            <a:xfrm>
-              <a:off x="3809550" y="4704850"/>
-              <a:ext cx="92100" cy="92100"/>
-            </a:xfrm>
-            <a:prstGeom prst="ellipse">
-              <a:avLst/>
-            </a:prstGeom>
-            <a:solidFill>
-              <a:schemeClr val="accent6">
-                <a:lumMod val="50000"/>
-                <a:alpha val="50000"/>
-              </a:schemeClr>
-            </a:solidFill>
-            <a:ln>
-              <a:noFill/>
-            </a:ln>
-          </p:spPr>
-          <p:txBody>
-            <a:bodyPr spcFirstLastPara="1" wrap="square" lIns="91425" tIns="91425" rIns="91425" bIns="91425" anchor="ctr" anchorCtr="0">
-              <a:noAutofit/>
-            </a:bodyPr>
-            <a:lstStyle/>
-            <a:p>
-              <a:pPr marL="0" lvl="0" indent="0" algn="l" rtl="0">
-                <a:spcBef>
-                  <a:spcPts val="0"/>
-                </a:spcBef>
-                <a:spcAft>
-                  <a:spcPts val="0"/>
-                </a:spcAft>
-                <a:buNone/>
-              </a:pPr>
-              <a:endParaRPr dirty="0"/>
-            </a:p>
-          </p:txBody>
-        </p:sp>
-        <p:sp>
-          <p:nvSpPr>
-            <p:cNvPr id="7" name="Google Shape;261;p33">
-              <a:extLst>
-                <a:ext uri="{FF2B5EF4-FFF2-40B4-BE49-F238E27FC236}">
-                  <a16:creationId xmlns:a16="http://schemas.microsoft.com/office/drawing/2014/main" id="{E8FE5283-5A9D-4D18-BD24-EDFFFA5C1D2C}"/>
-                </a:ext>
-              </a:extLst>
-            </p:cNvPr>
-            <p:cNvSpPr/>
-            <p:nvPr/>
-          </p:nvSpPr>
-          <p:spPr>
-            <a:xfrm>
-              <a:off x="4048350" y="4704850"/>
-              <a:ext cx="92100" cy="92100"/>
-            </a:xfrm>
-            <a:prstGeom prst="ellipse">
-              <a:avLst/>
-            </a:prstGeom>
-            <a:solidFill>
-              <a:schemeClr val="lt1">
-                <a:alpha val="50000"/>
-              </a:schemeClr>
-            </a:solidFill>
-            <a:ln>
-              <a:noFill/>
-            </a:ln>
-          </p:spPr>
-          <p:txBody>
-            <a:bodyPr spcFirstLastPara="1" wrap="square" lIns="91425" tIns="91425" rIns="91425" bIns="91425" anchor="ctr" anchorCtr="0">
-              <a:noAutofit/>
-            </a:bodyPr>
-            <a:lstStyle/>
-            <a:p>
-              <a:pPr marL="0" lvl="0" indent="0" algn="l" rtl="0">
-                <a:spcBef>
-                  <a:spcPts val="0"/>
-                </a:spcBef>
-                <a:spcAft>
-                  <a:spcPts val="0"/>
-                </a:spcAft>
-                <a:buNone/>
-              </a:pPr>
-              <a:endParaRPr/>
-            </a:p>
-          </p:txBody>
-        </p:sp>
-        <p:sp>
-          <p:nvSpPr>
-            <p:cNvPr id="8" name="Google Shape;262;p33">
-              <a:extLst>
-                <a:ext uri="{FF2B5EF4-FFF2-40B4-BE49-F238E27FC236}">
-                  <a16:creationId xmlns:a16="http://schemas.microsoft.com/office/drawing/2014/main" id="{3BC95966-78A2-4FDF-B241-B930C4981771}"/>
-                </a:ext>
-              </a:extLst>
-            </p:cNvPr>
-            <p:cNvSpPr/>
-            <p:nvPr/>
-          </p:nvSpPr>
-          <p:spPr>
-            <a:xfrm>
-              <a:off x="4287150" y="4704850"/>
-              <a:ext cx="92100" cy="92100"/>
-            </a:xfrm>
-            <a:prstGeom prst="ellipse">
-              <a:avLst/>
-            </a:prstGeom>
-            <a:solidFill>
-              <a:schemeClr val="lt1">
-                <a:alpha val="50000"/>
-              </a:schemeClr>
-            </a:solidFill>
-            <a:ln>
-              <a:noFill/>
-            </a:ln>
-          </p:spPr>
-          <p:txBody>
-            <a:bodyPr spcFirstLastPara="1" wrap="square" lIns="91425" tIns="91425" rIns="91425" bIns="91425" anchor="ctr" anchorCtr="0">
-              <a:noAutofit/>
-            </a:bodyPr>
-            <a:lstStyle/>
-            <a:p>
-              <a:pPr marL="0" lvl="0" indent="0" algn="l" rtl="0">
-                <a:spcBef>
-                  <a:spcPts val="0"/>
-                </a:spcBef>
-                <a:spcAft>
-                  <a:spcPts val="0"/>
-                </a:spcAft>
-                <a:buNone/>
-              </a:pPr>
-              <a:endParaRPr/>
-            </a:p>
-          </p:txBody>
-        </p:sp>
-      </p:grpSp>
     </p:spTree>
     <p:extLst>
       <p:ext uri="{BB962C8B-B14F-4D97-AF65-F5344CB8AC3E}">
@@ -17039,8 +14835,13 @@
             <a:pPr lvl="1"/>
             <a:r>
               <a:rPr lang="fr-FR" dirty="0"/>
-              <a:t>Conservation des clients avec minimum 2 achats</a:t>
+              <a:t>Conservation des clients avec minimum 2 achats + 40% avec </a:t>
             </a:r>
+            <a:r>
+              <a:rPr lang="fr-FR"/>
+              <a:t>une fréquence de 1%</a:t>
+            </a:r>
+            <a:endParaRPr lang="fr-FR" dirty="0"/>
           </a:p>
         </p:txBody>
       </p:sp>
@@ -17059,7 +14860,7 @@
           <p:nvPr/>
         </p:nvPicPr>
         <p:blipFill>
-          <a:blip r:embed="rId2"/>
+          <a:blip r:embed="rId3"/>
           <a:stretch>
             <a:fillRect/>
           </a:stretch>
@@ -17165,10 +14966,10 @@
       </p:sp>
       <p:pic>
         <p:nvPicPr>
-          <p:cNvPr id="5" name="Image 4">
+          <p:cNvPr id="6" name="Image 5">
             <a:extLst>
               <a:ext uri="{FF2B5EF4-FFF2-40B4-BE49-F238E27FC236}">
-                <a16:creationId xmlns:a16="http://schemas.microsoft.com/office/drawing/2014/main" id="{6C579440-ADBE-497E-B94F-3FDEC8886A6A}"/>
+                <a16:creationId xmlns:a16="http://schemas.microsoft.com/office/drawing/2014/main" id="{BBD9B043-1A16-4899-8233-18835FAFEB47}"/>
               </a:ext>
             </a:extLst>
           </p:cNvPr>
@@ -17185,8 +14986,8 @@
         </p:blipFill>
         <p:spPr>
           <a:xfrm>
-            <a:off x="72000" y="1179300"/>
-            <a:ext cx="8999999" cy="3600000"/>
+            <a:off x="26276" y="1204964"/>
+            <a:ext cx="9091448" cy="3414056"/>
           </a:xfrm>
           <a:prstGeom prst="rect">
             <a:avLst/>

</xml_diff>